<commit_message>
a bunch of stuff...
</commit_message>
<xml_diff>
--- a/fullstack-javascript/Node.js and Couchbase - Full Stack JavaScript.pptx
+++ b/fullstack-javascript/Node.js and Couchbase - Full Stack JavaScript.pptx
@@ -5,7 +5,7 @@
     <p:sldMasterId id="2147483648" r:id="rId1"/>
   </p:sldMasterIdLst>
   <p:notesMasterIdLst>
-    <p:notesMasterId r:id="rId59"/>
+    <p:notesMasterId r:id="rId60"/>
   </p:notesMasterIdLst>
   <p:sldIdLst>
     <p:sldId id="256" r:id="rId2"/>
@@ -18,53 +18,54 @@
     <p:sldId id="315" r:id="rId9"/>
     <p:sldId id="261" r:id="rId10"/>
     <p:sldId id="262" r:id="rId11"/>
-    <p:sldId id="263" r:id="rId12"/>
-    <p:sldId id="264" r:id="rId13"/>
-    <p:sldId id="265" r:id="rId14"/>
-    <p:sldId id="266" r:id="rId15"/>
-    <p:sldId id="267" r:id="rId16"/>
-    <p:sldId id="268" r:id="rId17"/>
-    <p:sldId id="269" r:id="rId18"/>
-    <p:sldId id="270" r:id="rId19"/>
-    <p:sldId id="271" r:id="rId20"/>
-    <p:sldId id="272" r:id="rId21"/>
-    <p:sldId id="273" r:id="rId22"/>
-    <p:sldId id="274" r:id="rId23"/>
-    <p:sldId id="275" r:id="rId24"/>
-    <p:sldId id="276" r:id="rId25"/>
-    <p:sldId id="277" r:id="rId26"/>
-    <p:sldId id="278" r:id="rId27"/>
-    <p:sldId id="279" r:id="rId28"/>
-    <p:sldId id="318" r:id="rId29"/>
-    <p:sldId id="280" r:id="rId30"/>
-    <p:sldId id="281" r:id="rId31"/>
-    <p:sldId id="282" r:id="rId32"/>
-    <p:sldId id="283" r:id="rId33"/>
-    <p:sldId id="284" r:id="rId34"/>
-    <p:sldId id="285" r:id="rId35"/>
-    <p:sldId id="286" r:id="rId36"/>
-    <p:sldId id="287" r:id="rId37"/>
-    <p:sldId id="288" r:id="rId38"/>
-    <p:sldId id="289" r:id="rId39"/>
-    <p:sldId id="290" r:id="rId40"/>
-    <p:sldId id="291" r:id="rId41"/>
-    <p:sldId id="292" r:id="rId42"/>
-    <p:sldId id="293" r:id="rId43"/>
-    <p:sldId id="294" r:id="rId44"/>
-    <p:sldId id="295" r:id="rId45"/>
-    <p:sldId id="296" r:id="rId46"/>
-    <p:sldId id="299" r:id="rId47"/>
-    <p:sldId id="303" r:id="rId48"/>
-    <p:sldId id="304" r:id="rId49"/>
-    <p:sldId id="298" r:id="rId50"/>
-    <p:sldId id="300" r:id="rId51"/>
-    <p:sldId id="297" r:id="rId52"/>
-    <p:sldId id="301" r:id="rId53"/>
-    <p:sldId id="302" r:id="rId54"/>
-    <p:sldId id="305" r:id="rId55"/>
-    <p:sldId id="306" r:id="rId56"/>
-    <p:sldId id="307" r:id="rId57"/>
-    <p:sldId id="308" r:id="rId58"/>
+    <p:sldId id="319" r:id="rId12"/>
+    <p:sldId id="263" r:id="rId13"/>
+    <p:sldId id="264" r:id="rId14"/>
+    <p:sldId id="265" r:id="rId15"/>
+    <p:sldId id="266" r:id="rId16"/>
+    <p:sldId id="267" r:id="rId17"/>
+    <p:sldId id="268" r:id="rId18"/>
+    <p:sldId id="269" r:id="rId19"/>
+    <p:sldId id="270" r:id="rId20"/>
+    <p:sldId id="271" r:id="rId21"/>
+    <p:sldId id="272" r:id="rId22"/>
+    <p:sldId id="273" r:id="rId23"/>
+    <p:sldId id="274" r:id="rId24"/>
+    <p:sldId id="275" r:id="rId25"/>
+    <p:sldId id="276" r:id="rId26"/>
+    <p:sldId id="277" r:id="rId27"/>
+    <p:sldId id="278" r:id="rId28"/>
+    <p:sldId id="279" r:id="rId29"/>
+    <p:sldId id="318" r:id="rId30"/>
+    <p:sldId id="280" r:id="rId31"/>
+    <p:sldId id="281" r:id="rId32"/>
+    <p:sldId id="282" r:id="rId33"/>
+    <p:sldId id="283" r:id="rId34"/>
+    <p:sldId id="284" r:id="rId35"/>
+    <p:sldId id="285" r:id="rId36"/>
+    <p:sldId id="286" r:id="rId37"/>
+    <p:sldId id="287" r:id="rId38"/>
+    <p:sldId id="288" r:id="rId39"/>
+    <p:sldId id="289" r:id="rId40"/>
+    <p:sldId id="290" r:id="rId41"/>
+    <p:sldId id="291" r:id="rId42"/>
+    <p:sldId id="292" r:id="rId43"/>
+    <p:sldId id="293" r:id="rId44"/>
+    <p:sldId id="294" r:id="rId45"/>
+    <p:sldId id="295" r:id="rId46"/>
+    <p:sldId id="296" r:id="rId47"/>
+    <p:sldId id="299" r:id="rId48"/>
+    <p:sldId id="303" r:id="rId49"/>
+    <p:sldId id="304" r:id="rId50"/>
+    <p:sldId id="298" r:id="rId51"/>
+    <p:sldId id="300" r:id="rId52"/>
+    <p:sldId id="297" r:id="rId53"/>
+    <p:sldId id="301" r:id="rId54"/>
+    <p:sldId id="302" r:id="rId55"/>
+    <p:sldId id="305" r:id="rId56"/>
+    <p:sldId id="306" r:id="rId57"/>
+    <p:sldId id="307" r:id="rId58"/>
+    <p:sldId id="308" r:id="rId59"/>
   </p:sldIdLst>
   <p:sldSz cx="9144000" cy="6858000" type="screen4x3"/>
   <p:notesSz cx="6858000" cy="9144000"/>
@@ -1898,21 +1899,13 @@
             </a:r>
             <a:r>
               <a:rPr lang="en-US" baseline="0" dirty="0" smtClean="0"/>
-              <a:t> </a:t>
-            </a:r>
+              <a:t> like fast websites</a:t>
+            </a:r>
+          </a:p>
+          <a:p>
             <a:r>
               <a:rPr lang="en-US" baseline="0" dirty="0" smtClean="0"/>
-              <a:t>like fast websites</a:t>
-            </a:r>
-          </a:p>
-          <a:p>
-            <a:r>
-              <a:rPr lang="en-US" baseline="0" dirty="0" smtClean="0"/>
-              <a:t>- 	Slow </a:t>
-            </a:r>
-            <a:r>
-              <a:rPr lang="en-US" baseline="0" dirty="0" smtClean="0"/>
-              <a:t>responses loose </a:t>
+              <a:t>- 	Slow responses loose </a:t>
             </a:r>
             <a:r>
               <a:rPr lang="en-US" baseline="0" dirty="0" err="1" smtClean="0"/>
@@ -1985,31 +1978,19 @@
             </a:r>
             <a:r>
               <a:rPr lang="en-US" baseline="0" dirty="0" smtClean="0"/>
-              <a:t> </a:t>
-            </a:r>
+              <a:t> use rest so app servers don’t need to hold state</a:t>
+            </a:r>
+          </a:p>
+          <a:p>
             <a:r>
               <a:rPr lang="en-US" baseline="0" dirty="0" smtClean="0"/>
-              <a:t>use rest so app servers don’t need to hold state</a:t>
+              <a:t>- 	We don’t want our database to be the new bottleneck</a:t>
             </a:r>
           </a:p>
           <a:p>
             <a:r>
               <a:rPr lang="en-US" baseline="0" dirty="0" smtClean="0"/>
-              <a:t>- 	We </a:t>
-            </a:r>
-            <a:r>
-              <a:rPr lang="en-US" baseline="0" dirty="0" smtClean="0"/>
-              <a:t>don’t want our database to be the new bottleneck</a:t>
-            </a:r>
-          </a:p>
-          <a:p>
-            <a:r>
-              <a:rPr lang="en-US" baseline="0" dirty="0" smtClean="0"/>
-              <a:t>- 	Add </a:t>
-            </a:r>
-            <a:r>
-              <a:rPr lang="en-US" baseline="0" dirty="0" smtClean="0"/>
-              <a:t>more node = more power!</a:t>
+              <a:t>- 	Add more node = more power!</a:t>
             </a:r>
           </a:p>
         </p:txBody>
@@ -2077,15 +2058,7 @@
             </a:pPr>
             <a:r>
               <a:rPr lang="en-US" baseline="0" dirty="0" smtClean="0"/>
-              <a:t>Lot’s </a:t>
-            </a:r>
-            <a:r>
-              <a:rPr lang="en-US" baseline="0" dirty="0" smtClean="0"/>
-              <a:t>of free users, don’t want to hog </a:t>
-            </a:r>
-            <a:r>
-              <a:rPr lang="en-US" baseline="0" dirty="0" smtClean="0"/>
-              <a:t>resources</a:t>
+              <a:t>Lot’s of free users, don’t want to hog resources</a:t>
             </a:r>
           </a:p>
           <a:p>
@@ -2117,7 +2090,6 @@
               <a:rPr lang="en-US" baseline="0" dirty="0" smtClean="0"/>
               <a:t>Rendering is client side</a:t>
             </a:r>
-            <a:endParaRPr lang="en-US" baseline="0" dirty="0" smtClean="0"/>
           </a:p>
           <a:p>
             <a:endParaRPr lang="en-US" baseline="0" dirty="0" smtClean="0"/>
@@ -8598,7 +8570,7 @@
               </a:defRPr>
             </a:pPr>
             <a:r>
-              <a:rPr sz="2400" b="1" dirty="0" smtClean="0">
+              <a:rPr sz="2400" dirty="0" smtClean="0">
                 <a:solidFill>
                   <a:srgbClr val="3F3F3F"/>
                 </a:solidFill>
@@ -8611,7 +8583,7 @@
               <a:t>Event </a:t>
             </a:r>
             <a:r>
-              <a:rPr sz="2400" b="1" dirty="0">
+              <a:rPr sz="2400" dirty="0">
                 <a:solidFill>
                   <a:srgbClr val="3F3F3F"/>
                 </a:solidFill>
@@ -8663,7 +8635,7 @@
               </a:defRPr>
             </a:pPr>
             <a:r>
-              <a:rPr sz="2400" b="1" dirty="0">
+              <a:rPr sz="2400" dirty="0">
                 <a:solidFill>
                   <a:srgbClr val="3F3F3F"/>
                 </a:solidFill>
@@ -8770,7 +8742,7 @@
               </a:defRPr>
             </a:pPr>
             <a:r>
-              <a:rPr sz="2400" b="1" dirty="0">
+              <a:rPr sz="2400" dirty="0">
                 <a:solidFill>
                   <a:srgbClr val="3F3F3F"/>
                 </a:solidFill>
@@ -8921,17 +8893,8 @@
               </a:defRPr>
             </a:pPr>
             <a:r>
-              <a:rPr sz="2200" b="1">
-                <a:solidFill>
-                  <a:srgbClr val="3F3F3F"/>
-                </a:solidFill>
-                <a:uFill>
-                  <a:solidFill>
-                    <a:srgbClr val="3F3F3F"/>
-                  </a:solidFill>
-                </a:uFill>
-              </a:rPr>
-              <a:t>Document database</a:t>
+              <a:rPr lang="en-US" sz="2200" dirty="0"/>
+              <a:t>Sub-millisecond latency</a:t>
             </a:r>
           </a:p>
           <a:p>
@@ -8953,17 +8916,8 @@
               </a:defRPr>
             </a:pPr>
             <a:r>
-              <a:rPr>
-                <a:solidFill>
-                  <a:srgbClr val="3F3F3F"/>
-                </a:solidFill>
-                <a:uFill>
-                  <a:solidFill>
-                    <a:srgbClr val="3F3F3F"/>
-                  </a:solidFill>
-                </a:uFill>
-              </a:rPr>
-              <a:t>Designed for JSON</a:t>
+              <a:rPr lang="en-US" dirty="0"/>
+              <a:t>Gives you the consistent performance needed to build complex, interactive game play</a:t>
             </a:r>
           </a:p>
           <a:p>
@@ -8979,17 +8933,8 @@
               </a:defRPr>
             </a:pPr>
             <a:r>
-              <a:rPr sz="2200" b="1">
-                <a:solidFill>
-                  <a:srgbClr val="3F3F3F"/>
-                </a:solidFill>
-                <a:uFill>
-                  <a:solidFill>
-                    <a:srgbClr val="3F3F3F"/>
-                  </a:solidFill>
-                </a:uFill>
-              </a:rPr>
-              <a:t>Sub-millisecond latency</a:t>
+              <a:rPr lang="en-US" sz="2200" dirty="0"/>
+              <a:t>Designed for Scale</a:t>
             </a:r>
           </a:p>
           <a:p>
@@ -9011,17 +8956,8 @@
               </a:defRPr>
             </a:pPr>
             <a:r>
-              <a:rPr>
-                <a:solidFill>
-                  <a:srgbClr val="3F3F3F"/>
-                </a:solidFill>
-                <a:uFill>
-                  <a:solidFill>
-                    <a:srgbClr val="3F3F3F"/>
-                  </a:solidFill>
-                </a:uFill>
-              </a:rPr>
-              <a:t>Gives you the consistent performance needed to build complex, interactive game play</a:t>
+              <a:rPr lang="en-US" dirty="0"/>
+              <a:t>Add and remove nodes as needed</a:t>
             </a:r>
           </a:p>
           <a:p>
@@ -9037,17 +8973,8 @@
               </a:defRPr>
             </a:pPr>
             <a:r>
-              <a:rPr sz="2200" b="1">
-                <a:solidFill>
-                  <a:srgbClr val="3F3F3F"/>
-                </a:solidFill>
-                <a:uFill>
-                  <a:solidFill>
-                    <a:srgbClr val="3F3F3F"/>
-                  </a:solidFill>
-                </a:uFill>
-              </a:rPr>
-              <a:t>Designed for Scale</a:t>
+              <a:rPr lang="en-US" sz="2200" dirty="0"/>
+              <a:t>Efficiency</a:t>
             </a:r>
           </a:p>
           <a:p>
@@ -9069,19 +8996,112 @@
               </a:defRPr>
             </a:pPr>
             <a:r>
-              <a:rPr>
-                <a:solidFill>
-                  <a:srgbClr val="3F3F3F"/>
-                </a:solidFill>
-                <a:uFill>
-                  <a:solidFill>
-                    <a:srgbClr val="3F3F3F"/>
-                  </a:solidFill>
-                </a:uFill>
-              </a:rPr>
-              <a:t>Add and remove nodes as needed</a:t>
-            </a:r>
-          </a:p>
+              <a:rPr lang="en-US" dirty="0"/>
+              <a:t>Couchbase manages system resources such as memory and CPU efficiently</a:t>
+            </a:r>
+            <a:endParaRPr lang="en-US" dirty="0"/>
+          </a:p>
+        </p:txBody>
+      </p:sp>
+    </p:spTree>
+    <p:extLst>
+      <p:ext uri="{BB962C8B-B14F-4D97-AF65-F5344CB8AC3E}">
+        <p14:creationId xmlns:p14="http://schemas.microsoft.com/office/powerpoint/2010/main" val="3954196149"/>
+      </p:ext>
+    </p:extLst>
+  </p:cSld>
+  <p:clrMapOvr>
+    <a:masterClrMapping/>
+  </p:clrMapOvr>
+  <p:transition xmlns:p14="http://schemas.microsoft.com/office/powerpoint/2010/main" spd="med"/>
+  <p:timing>
+    <p:tnLst>
+      <p:par>
+        <p:cTn xmlns:p14="http://schemas.microsoft.com/office/powerpoint/2010/main" id="1" dur="indefinite" restart="never" fill="hold" nodeType="tmRoot"/>
+      </p:par>
+    </p:tnLst>
+  </p:timing>
+</p:sld>
+</file>
+
+<file path=ppt/slides/slide12.xml><?xml version="1.0" encoding="utf-8"?>
+<p:sld xmlns:a="http://schemas.openxmlformats.org/drawingml/2006/main" xmlns:r="http://schemas.openxmlformats.org/officeDocument/2006/relationships" xmlns:p="http://schemas.openxmlformats.org/presentationml/2006/main">
+  <p:cSld>
+    <p:spTree>
+      <p:nvGrpSpPr>
+        <p:cNvPr id="1" name=""/>
+        <p:cNvGrpSpPr/>
+        <p:nvPr/>
+      </p:nvGrpSpPr>
+      <p:grpSpPr>
+        <a:xfrm>
+          <a:off x="0" y="0"/>
+          <a:ext cx="0" cy="0"/>
+          <a:chOff x="0" y="0"/>
+          <a:chExt cx="0" cy="0"/>
+        </a:xfrm>
+      </p:grpSpPr>
+      <p:sp>
+        <p:nvSpPr>
+          <p:cNvPr id="163" name="Shape 163"/>
+          <p:cNvSpPr>
+            <a:spLocks noGrp="1"/>
+          </p:cNvSpPr>
+          <p:nvPr>
+            <p:ph type="title"/>
+          </p:nvPr>
+        </p:nvSpPr>
+        <p:spPr>
+          <a:prstGeom prst="rect">
+            <a:avLst/>
+          </a:prstGeom>
+        </p:spPr>
+        <p:txBody>
+          <a:bodyPr/>
+          <a:lstStyle/>
+          <a:p>
+            <a:pPr lvl="0">
+              <a:defRPr sz="1800" b="0">
+                <a:solidFill>
+                  <a:srgbClr val="000000"/>
+                </a:solidFill>
+                <a:uFillTx/>
+              </a:defRPr>
+            </a:pPr>
+            <a:r>
+              <a:rPr sz="4000" b="1">
+                <a:solidFill>
+                  <a:srgbClr val="3F3F3F"/>
+                </a:solidFill>
+                <a:uFill>
+                  <a:solidFill>
+                    <a:srgbClr val="3F3F3F"/>
+                  </a:solidFill>
+                </a:uFill>
+              </a:rPr>
+              <a:t>Couchbase</a:t>
+            </a:r>
+          </a:p>
+        </p:txBody>
+      </p:sp>
+      <p:sp>
+        <p:nvSpPr>
+          <p:cNvPr id="164" name="Shape 164"/>
+          <p:cNvSpPr>
+            <a:spLocks noGrp="1"/>
+          </p:cNvSpPr>
+          <p:nvPr>
+            <p:ph type="body" idx="1"/>
+          </p:nvPr>
+        </p:nvSpPr>
+        <p:spPr>
+          <a:prstGeom prst="rect">
+            <a:avLst/>
+          </a:prstGeom>
+        </p:spPr>
+        <p:txBody>
+          <a:bodyPr/>
+          <a:lstStyle/>
           <a:p>
             <a:pPr lvl="0">
               <a:lnSpc>
@@ -9095,30 +9115,38 @@
               </a:defRPr>
             </a:pPr>
             <a:r>
-              <a:rPr sz="2200" b="1">
-                <a:solidFill>
-                  <a:srgbClr val="3F3F3F"/>
-                </a:solidFill>
-                <a:uFill>
-                  <a:solidFill>
-                    <a:srgbClr val="3F3F3F"/>
-                  </a:solidFill>
-                </a:uFill>
-              </a:rPr>
-              <a:t>Efficiency</a:t>
-            </a:r>
-          </a:p>
-          <a:p>
-            <a:pPr marL="685800" lvl="1" indent="-347472">
+              <a:rPr sz="2200" b="0" dirty="0">
+                <a:solidFill>
+                  <a:srgbClr val="3F3F3F"/>
+                </a:solidFill>
+                <a:uFill>
+                  <a:solidFill>
+                    <a:srgbClr val="3F3F3F"/>
+                  </a:solidFill>
+                </a:uFill>
+              </a:rPr>
+              <a:t>Document </a:t>
+            </a:r>
+            <a:r>
+              <a:rPr sz="2200" b="0" dirty="0" smtClean="0">
+                <a:solidFill>
+                  <a:srgbClr val="3F3F3F"/>
+                </a:solidFill>
+                <a:uFill>
+                  <a:solidFill>
+                    <a:srgbClr val="3F3F3F"/>
+                  </a:solidFill>
+                </a:uFill>
+              </a:rPr>
+              <a:t>database</a:t>
+            </a:r>
+            <a:endParaRPr lang="en-US" sz="1800" b="0" dirty="0"/>
+          </a:p>
+          <a:p>
+            <a:pPr lvl="0">
               <a:lnSpc>
                 <a:spcPct val="80000"/>
               </a:lnSpc>
-              <a:spcBef>
-                <a:spcPts val="600"/>
-              </a:spcBef>
-              <a:buClr>
-                <a:srgbClr val="8C8C8C"/>
-              </a:buClr>
               <a:defRPr sz="1800" b="0">
                 <a:solidFill>
                   <a:srgbClr val="000000"/>
@@ -9127,18 +9155,135 @@
               </a:defRPr>
             </a:pPr>
             <a:r>
-              <a:rPr>
-                <a:solidFill>
-                  <a:srgbClr val="3F3F3F"/>
-                </a:solidFill>
-                <a:uFill>
-                  <a:solidFill>
-                    <a:srgbClr val="3F3F3F"/>
-                  </a:solidFill>
-                </a:uFill>
-              </a:rPr>
-              <a:t>Couchbase manages system resources such as memory and CPU efficiently</a:t>
-            </a:r>
+              <a:rPr lang="en-US" sz="2200" b="0" dirty="0" smtClean="0">
+                <a:solidFill>
+                  <a:srgbClr val="3F3F3F"/>
+                </a:solidFill>
+                <a:uFill>
+                  <a:solidFill>
+                    <a:srgbClr val="3F3F3F"/>
+                  </a:solidFill>
+                </a:uFill>
+              </a:rPr>
+              <a:t>Store different data types</a:t>
+            </a:r>
+          </a:p>
+          <a:p>
+            <a:pPr lvl="1">
+              <a:lnSpc>
+                <a:spcPct val="80000"/>
+              </a:lnSpc>
+              <a:defRPr sz="1800" b="0">
+                <a:solidFill>
+                  <a:srgbClr val="000000"/>
+                </a:solidFill>
+                <a:uFillTx/>
+              </a:defRPr>
+            </a:pPr>
+            <a:r>
+              <a:rPr lang="en-US" sz="2200" b="0" dirty="0" smtClean="0">
+                <a:solidFill>
+                  <a:srgbClr val="000000"/>
+                </a:solidFill>
+                <a:uFillTx/>
+              </a:rPr>
+              <a:t>Counters</a:t>
+            </a:r>
+          </a:p>
+          <a:p>
+            <a:pPr lvl="1">
+              <a:lnSpc>
+                <a:spcPct val="80000"/>
+              </a:lnSpc>
+              <a:defRPr sz="1800" b="0">
+                <a:solidFill>
+                  <a:srgbClr val="000000"/>
+                </a:solidFill>
+                <a:uFillTx/>
+              </a:defRPr>
+            </a:pPr>
+            <a:r>
+              <a:rPr lang="en-US" sz="2200" b="0" dirty="0" smtClean="0">
+                <a:solidFill>
+                  <a:srgbClr val="000000"/>
+                </a:solidFill>
+                <a:uFillTx/>
+              </a:rPr>
+              <a:t>Numbers</a:t>
+            </a:r>
+          </a:p>
+          <a:p>
+            <a:pPr lvl="1">
+              <a:lnSpc>
+                <a:spcPct val="80000"/>
+              </a:lnSpc>
+              <a:defRPr sz="1800" b="0">
+                <a:solidFill>
+                  <a:srgbClr val="000000"/>
+                </a:solidFill>
+                <a:uFillTx/>
+              </a:defRPr>
+            </a:pPr>
+            <a:r>
+              <a:rPr lang="en-US" sz="2200" b="0" dirty="0" smtClean="0">
+                <a:solidFill>
+                  <a:srgbClr val="000000"/>
+                </a:solidFill>
+                <a:uFillTx/>
+              </a:rPr>
+              <a:t>Strings</a:t>
+            </a:r>
+          </a:p>
+          <a:p>
+            <a:pPr lvl="1">
+              <a:lnSpc>
+                <a:spcPct val="80000"/>
+              </a:lnSpc>
+              <a:defRPr sz="1800" b="0">
+                <a:solidFill>
+                  <a:srgbClr val="000000"/>
+                </a:solidFill>
+                <a:uFillTx/>
+              </a:defRPr>
+            </a:pPr>
+            <a:r>
+              <a:rPr lang="en-US" sz="2200" b="0" dirty="0" smtClean="0">
+                <a:solidFill>
+                  <a:srgbClr val="000000"/>
+                </a:solidFill>
+                <a:uFillTx/>
+              </a:rPr>
+              <a:t>JSON</a:t>
+            </a:r>
+            <a:endParaRPr lang="en-US" sz="2200" b="0" dirty="0" smtClean="0">
+              <a:solidFill>
+                <a:srgbClr val="000000"/>
+              </a:solidFill>
+              <a:uFillTx/>
+            </a:endParaRPr>
+          </a:p>
+          <a:p>
+            <a:pPr lvl="1">
+              <a:lnSpc>
+                <a:spcPct val="80000"/>
+              </a:lnSpc>
+              <a:defRPr sz="1800" b="0">
+                <a:solidFill>
+                  <a:srgbClr val="000000"/>
+                </a:solidFill>
+                <a:uFillTx/>
+              </a:defRPr>
+            </a:pPr>
+            <a:endParaRPr sz="2200" b="0" dirty="0">
+              <a:solidFill>
+                <a:srgbClr val="3F3F3F"/>
+              </a:solidFill>
+              <a:uFill>
+                <a:solidFill>
+                  <a:srgbClr val="3F3F3F"/>
+                </a:solidFill>
+              </a:uFill>
+            </a:endParaRPr>
           </a:p>
         </p:txBody>
       </p:sp>
@@ -9158,7 +9303,7 @@
 </p:sld>
 </file>
 
-<file path=ppt/slides/slide12.xml><?xml version="1.0" encoding="utf-8"?>
+<file path=ppt/slides/slide13.xml><?xml version="1.0" encoding="utf-8"?>
 <p:sld xmlns:a="http://schemas.openxmlformats.org/drawingml/2006/main" xmlns:r="http://schemas.openxmlformats.org/officeDocument/2006/relationships" xmlns:p="http://schemas.openxmlformats.org/presentationml/2006/main">
   <p:cSld>
     <p:spTree>
@@ -9269,7 +9414,7 @@
 </p:sld>
 </file>
 
-<file path=ppt/slides/slide13.xml><?xml version="1.0" encoding="utf-8"?>
+<file path=ppt/slides/slide14.xml><?xml version="1.0" encoding="utf-8"?>
 <p:sld xmlns:a="http://schemas.openxmlformats.org/drawingml/2006/main" xmlns:r="http://schemas.openxmlformats.org/officeDocument/2006/relationships" xmlns:p="http://schemas.openxmlformats.org/presentationml/2006/main">
   <p:cSld>
     <p:spTree>
@@ -10072,7 +10217,7 @@
 </p:sld>
 </file>
 
-<file path=ppt/slides/slide14.xml><?xml version="1.0" encoding="utf-8"?>
+<file path=ppt/slides/slide15.xml><?xml version="1.0" encoding="utf-8"?>
 <p:sld xmlns:a="http://schemas.openxmlformats.org/drawingml/2006/main" xmlns:r="http://schemas.openxmlformats.org/officeDocument/2006/relationships" xmlns:p="http://schemas.openxmlformats.org/presentationml/2006/main">
   <p:cSld>
     <p:spTree>
@@ -10180,7 +10325,7 @@
 </p:sld>
 </file>
 
-<file path=ppt/slides/slide15.xml><?xml version="1.0" encoding="utf-8"?>
+<file path=ppt/slides/slide16.xml><?xml version="1.0" encoding="utf-8"?>
 <p:sld xmlns:a="http://schemas.openxmlformats.org/drawingml/2006/main" xmlns:r="http://schemas.openxmlformats.org/officeDocument/2006/relationships" xmlns:p="http://schemas.openxmlformats.org/presentationml/2006/main">
   <p:cSld>
     <p:spTree>
@@ -10270,7 +10415,7 @@
               </a:defRPr>
             </a:pPr>
             <a:r>
-              <a:rPr sz="2400" b="1" dirty="0">
+              <a:rPr sz="2400" dirty="0">
                 <a:solidFill>
                   <a:srgbClr val="3F3F3F"/>
                 </a:solidFill>
@@ -10359,7 +10504,7 @@
               </a:defRPr>
             </a:pPr>
             <a:r>
-              <a:rPr sz="2400" b="1" dirty="0">
+              <a:rPr sz="2400" dirty="0">
                 <a:solidFill>
                   <a:srgbClr val="3F3F3F"/>
                 </a:solidFill>
@@ -10454,7 +10599,7 @@
 </p:sld>
 </file>
 
-<file path=ppt/slides/slide16.xml><?xml version="1.0" encoding="utf-8"?>
+<file path=ppt/slides/slide17.xml><?xml version="1.0" encoding="utf-8"?>
 <p:sld xmlns:a="http://schemas.openxmlformats.org/drawingml/2006/main" xmlns:r="http://schemas.openxmlformats.org/officeDocument/2006/relationships" xmlns:p="http://schemas.openxmlformats.org/presentationml/2006/main">
   <p:cSld>
     <p:spTree>
@@ -10558,7 +10703,7 @@
 </p:sld>
 </file>
 
-<file path=ppt/slides/slide17.xml><?xml version="1.0" encoding="utf-8"?>
+<file path=ppt/slides/slide18.xml><?xml version="1.0" encoding="utf-8"?>
 <p:sld xmlns:a="http://schemas.openxmlformats.org/drawingml/2006/main" xmlns:r="http://schemas.openxmlformats.org/officeDocument/2006/relationships" xmlns:p="http://schemas.openxmlformats.org/presentationml/2006/main">
   <p:cSld>
     <p:spTree>
@@ -11612,7 +11757,7 @@
 </p:sld>
 </file>
 
-<file path=ppt/slides/slide18.xml><?xml version="1.0" encoding="utf-8"?>
+<file path=ppt/slides/slide19.xml><?xml version="1.0" encoding="utf-8"?>
 <p:sld xmlns:a="http://schemas.openxmlformats.org/drawingml/2006/main" xmlns:r="http://schemas.openxmlformats.org/officeDocument/2006/relationships" xmlns:p="http://schemas.openxmlformats.org/presentationml/2006/main">
   <p:cSld>
     <p:spTree>
@@ -12648,7 +12793,121 @@
 </p:sld>
 </file>
 
-<file path=ppt/slides/slide19.xml><?xml version="1.0" encoding="utf-8"?>
+<file path=ppt/slides/slide2.xml><?xml version="1.0" encoding="utf-8"?>
+<p:sld xmlns:a="http://schemas.openxmlformats.org/drawingml/2006/main" xmlns:r="http://schemas.openxmlformats.org/officeDocument/2006/relationships" xmlns:p="http://schemas.openxmlformats.org/presentationml/2006/main">
+  <p:cSld>
+    <p:spTree>
+      <p:nvGrpSpPr>
+        <p:cNvPr id="1" name=""/>
+        <p:cNvGrpSpPr/>
+        <p:nvPr/>
+      </p:nvGrpSpPr>
+      <p:grpSpPr>
+        <a:xfrm>
+          <a:off x="0" y="0"/>
+          <a:ext cx="0" cy="0"/>
+          <a:chOff x="0" y="0"/>
+          <a:chExt cx="0" cy="0"/>
+        </a:xfrm>
+      </p:grpSpPr>
+      <p:sp>
+        <p:nvSpPr>
+          <p:cNvPr id="2" name="Title 1"/>
+          <p:cNvSpPr>
+            <a:spLocks noGrp="1"/>
+          </p:cNvSpPr>
+          <p:nvPr>
+            <p:ph type="title"/>
+          </p:nvPr>
+        </p:nvSpPr>
+        <p:spPr>
+          <a:xfrm>
+            <a:off x="685800" y="2003615"/>
+            <a:ext cx="7772400" cy="719829"/>
+          </a:xfrm>
+        </p:spPr>
+        <p:txBody>
+          <a:bodyPr/>
+          <a:lstStyle/>
+          <a:p>
+            <a:r>
+              <a:rPr lang="en-US" dirty="0" smtClean="0">
+                <a:solidFill>
+                  <a:srgbClr val="28B2CB"/>
+                </a:solidFill>
+                <a:uFill>
+                  <a:solidFill>
+                    <a:srgbClr val="28B2CB"/>
+                  </a:solidFill>
+                </a:uFill>
+              </a:rPr>
+              <a:t>Full-Stack JavaScript</a:t>
+            </a:r>
+            <a:endParaRPr lang="en-US" dirty="0"/>
+          </a:p>
+        </p:txBody>
+      </p:sp>
+      <p:sp>
+        <p:nvSpPr>
+          <p:cNvPr id="3" name="Text Placeholder 2"/>
+          <p:cNvSpPr>
+            <a:spLocks noGrp="1"/>
+          </p:cNvSpPr>
+          <p:nvPr>
+            <p:ph type="body" idx="1"/>
+          </p:nvPr>
+        </p:nvSpPr>
+        <p:spPr>
+          <a:xfrm>
+            <a:off x="1371600" y="3262338"/>
+            <a:ext cx="6400800" cy="3426329"/>
+          </a:xfrm>
+        </p:spPr>
+        <p:txBody>
+          <a:bodyPr/>
+          <a:lstStyle/>
+          <a:p>
+            <a:r>
+              <a:rPr lang="en-US" dirty="0" smtClean="0"/>
+              <a:t>Couchbase, </a:t>
+            </a:r>
+            <a:r>
+              <a:rPr lang="en-US" dirty="0" smtClean="0"/>
+              <a:t>node.js, and some </a:t>
+            </a:r>
+            <a:r>
+              <a:rPr lang="en-US" dirty="0" err="1" smtClean="0"/>
+              <a:t>AngularJS</a:t>
+            </a:r>
+            <a:endParaRPr lang="en-US" dirty="0"/>
+          </a:p>
+          <a:p>
+            <a:endParaRPr lang="en-US" dirty="0"/>
+          </a:p>
+        </p:txBody>
+      </p:sp>
+    </p:spTree>
+    <p:extLst>
+      <p:ext uri="{BB962C8B-B14F-4D97-AF65-F5344CB8AC3E}">
+        <p14:creationId xmlns:p14="http://schemas.microsoft.com/office/powerpoint/2010/main" val="3078611872"/>
+      </p:ext>
+    </p:extLst>
+  </p:cSld>
+  <p:clrMapOvr>
+    <a:masterClrMapping/>
+  </p:clrMapOvr>
+  <p:transition xmlns:p14="http://schemas.microsoft.com/office/powerpoint/2010/main" spd="med"/>
+  <p:timing>
+    <p:tnLst>
+      <p:par>
+        <p:cTn xmlns:p14="http://schemas.microsoft.com/office/powerpoint/2010/main" id="1" dur="indefinite" restart="never" nodeType="tmRoot"/>
+      </p:par>
+    </p:tnLst>
+  </p:timing>
+</p:sld>
+</file>
+
+<file path=ppt/slides/slide20.xml><?xml version="1.0" encoding="utf-8"?>
 <p:sld xmlns:a="http://schemas.openxmlformats.org/drawingml/2006/main" xmlns:r="http://schemas.openxmlformats.org/officeDocument/2006/relationships" xmlns:p="http://schemas.openxmlformats.org/presentationml/2006/main">
   <p:cSld>
     <p:spTree>
@@ -12774,7 +13033,7 @@
                   </a:solidFill>
                 </a:uFill>
               </a:rPr>
-              <a:t>19</a:t>
+              <a:t>20</a:t>
             </a:fld>
             <a:endParaRPr sz="1200">
               <a:solidFill>
@@ -12869,125 +13128,7 @@
 </p:sld>
 </file>
 
-<file path=ppt/slides/slide2.xml><?xml version="1.0" encoding="utf-8"?>
-<p:sld xmlns:a="http://schemas.openxmlformats.org/drawingml/2006/main" xmlns:r="http://schemas.openxmlformats.org/officeDocument/2006/relationships" xmlns:p="http://schemas.openxmlformats.org/presentationml/2006/main">
-  <p:cSld>
-    <p:spTree>
-      <p:nvGrpSpPr>
-        <p:cNvPr id="1" name=""/>
-        <p:cNvGrpSpPr/>
-        <p:nvPr/>
-      </p:nvGrpSpPr>
-      <p:grpSpPr>
-        <a:xfrm>
-          <a:off x="0" y="0"/>
-          <a:ext cx="0" cy="0"/>
-          <a:chOff x="0" y="0"/>
-          <a:chExt cx="0" cy="0"/>
-        </a:xfrm>
-      </p:grpSpPr>
-      <p:sp>
-        <p:nvSpPr>
-          <p:cNvPr id="2" name="Title 1"/>
-          <p:cNvSpPr>
-            <a:spLocks noGrp="1"/>
-          </p:cNvSpPr>
-          <p:nvPr>
-            <p:ph type="title"/>
-          </p:nvPr>
-        </p:nvSpPr>
-        <p:spPr>
-          <a:xfrm>
-            <a:off x="685800" y="2003615"/>
-            <a:ext cx="7772400" cy="719829"/>
-          </a:xfrm>
-        </p:spPr>
-        <p:txBody>
-          <a:bodyPr/>
-          <a:lstStyle/>
-          <a:p>
-            <a:r>
-              <a:rPr lang="en-US" dirty="0" smtClean="0">
-                <a:solidFill>
-                  <a:srgbClr val="28B2CB"/>
-                </a:solidFill>
-                <a:uFill>
-                  <a:solidFill>
-                    <a:srgbClr val="28B2CB"/>
-                  </a:solidFill>
-                </a:uFill>
-              </a:rPr>
-              <a:t>Full-Stack JavaScript</a:t>
-            </a:r>
-            <a:endParaRPr lang="en-US" dirty="0"/>
-          </a:p>
-        </p:txBody>
-      </p:sp>
-      <p:sp>
-        <p:nvSpPr>
-          <p:cNvPr id="3" name="Text Placeholder 2"/>
-          <p:cNvSpPr>
-            <a:spLocks noGrp="1"/>
-          </p:cNvSpPr>
-          <p:nvPr>
-            <p:ph type="body" idx="1"/>
-          </p:nvPr>
-        </p:nvSpPr>
-        <p:spPr>
-          <a:xfrm>
-            <a:off x="1371600" y="3262338"/>
-            <a:ext cx="6400800" cy="3426329"/>
-          </a:xfrm>
-        </p:spPr>
-        <p:txBody>
-          <a:bodyPr/>
-          <a:lstStyle/>
-          <a:p>
-            <a:r>
-              <a:rPr lang="en-US" dirty="0" smtClean="0"/>
-              <a:t>Couchbase, </a:t>
-            </a:r>
-            <a:r>
-              <a:rPr lang="en-US" dirty="0" err="1" smtClean="0"/>
-              <a:t>node.js</a:t>
-            </a:r>
-            <a:r>
-              <a:rPr lang="en-US" dirty="0" smtClean="0"/>
-              <a:t> and </a:t>
-            </a:r>
-            <a:r>
-              <a:rPr lang="en-US" dirty="0" err="1" smtClean="0"/>
-              <a:t>AngularJS</a:t>
-            </a:r>
-            <a:endParaRPr lang="en-US" dirty="0"/>
-          </a:p>
-          <a:p>
-            <a:endParaRPr lang="en-US" dirty="0"/>
-          </a:p>
-        </p:txBody>
-      </p:sp>
-    </p:spTree>
-    <p:extLst>
-      <p:ext uri="{BB962C8B-B14F-4D97-AF65-F5344CB8AC3E}">
-        <p14:creationId xmlns:p14="http://schemas.microsoft.com/office/powerpoint/2010/main" val="3078611872"/>
-      </p:ext>
-    </p:extLst>
-  </p:cSld>
-  <p:clrMapOvr>
-    <a:masterClrMapping/>
-  </p:clrMapOvr>
-  <p:transition xmlns:p14="http://schemas.microsoft.com/office/powerpoint/2010/main" spd="med"/>
-  <p:timing>
-    <p:tnLst>
-      <p:par>
-        <p:cTn xmlns:p14="http://schemas.microsoft.com/office/powerpoint/2010/main" id="1" dur="indefinite" restart="never" nodeType="tmRoot"/>
-      </p:par>
-    </p:tnLst>
-  </p:timing>
-</p:sld>
-</file>
-
-<file path=ppt/slides/slide20.xml><?xml version="1.0" encoding="utf-8"?>
+<file path=ppt/slides/slide21.xml><?xml version="1.0" encoding="utf-8"?>
 <p:sld xmlns:a="http://schemas.openxmlformats.org/drawingml/2006/main" xmlns:r="http://schemas.openxmlformats.org/officeDocument/2006/relationships" xmlns:p="http://schemas.openxmlformats.org/presentationml/2006/main">
   <p:cSld>
     <p:spTree>
@@ -13077,7 +13218,7 @@
 </p:sld>
 </file>
 
-<file path=ppt/slides/slide21.xml><?xml version="1.0" encoding="utf-8"?>
+<file path=ppt/slides/slide22.xml><?xml version="1.0" encoding="utf-8"?>
 <p:sld xmlns:a="http://schemas.openxmlformats.org/drawingml/2006/main" xmlns:r="http://schemas.openxmlformats.org/officeDocument/2006/relationships" xmlns:p="http://schemas.openxmlformats.org/presentationml/2006/main">
   <p:cSld>
     <p:spTree>
@@ -13236,7 +13377,7 @@
 </p:sld>
 </file>
 
-<file path=ppt/slides/slide22.xml><?xml version="1.0" encoding="utf-8"?>
+<file path=ppt/slides/slide23.xml><?xml version="1.0" encoding="utf-8"?>
 <p:sld xmlns:a="http://schemas.openxmlformats.org/drawingml/2006/main" xmlns:r="http://schemas.openxmlformats.org/officeDocument/2006/relationships" xmlns:p="http://schemas.openxmlformats.org/presentationml/2006/main">
   <p:cSld>
     <p:spTree>
@@ -13398,7 +13539,7 @@
 </p:sld>
 </file>
 
-<file path=ppt/slides/slide23.xml><?xml version="1.0" encoding="utf-8"?>
+<file path=ppt/slides/slide24.xml><?xml version="1.0" encoding="utf-8"?>
 <p:sld xmlns:a="http://schemas.openxmlformats.org/drawingml/2006/main" xmlns:r="http://schemas.openxmlformats.org/officeDocument/2006/relationships" xmlns:p="http://schemas.openxmlformats.org/presentationml/2006/main">
   <p:cSld>
     <p:spTree>
@@ -13923,7 +14064,7 @@
 </p:sld>
 </file>
 
-<file path=ppt/slides/slide24.xml><?xml version="1.0" encoding="utf-8"?>
+<file path=ppt/slides/slide25.xml><?xml version="1.0" encoding="utf-8"?>
 <p:sld xmlns:a="http://schemas.openxmlformats.org/drawingml/2006/main" xmlns:r="http://schemas.openxmlformats.org/officeDocument/2006/relationships" xmlns:p="http://schemas.openxmlformats.org/presentationml/2006/main">
   <p:cSld>
     <p:spTree>
@@ -14422,10 +14563,17 @@
     <a:masterClrMapping/>
   </p:clrMapOvr>
   <p:transition xmlns:p14="http://schemas.microsoft.com/office/powerpoint/2010/main" spd="med"/>
+  <p:timing>
+    <p:tnLst>
+      <p:par>
+        <p:cTn xmlns:p14="http://schemas.microsoft.com/office/powerpoint/2010/main" id="1" dur="indefinite" restart="never" nodeType="tmRoot"/>
+      </p:par>
+    </p:tnLst>
+  </p:timing>
 </p:sld>
 </file>
 
-<file path=ppt/slides/slide25.xml><?xml version="1.0" encoding="utf-8"?>
+<file path=ppt/slides/slide26.xml><?xml version="1.0" encoding="utf-8"?>
 <p:sld xmlns:a="http://schemas.openxmlformats.org/drawingml/2006/main" xmlns:r="http://schemas.openxmlformats.org/officeDocument/2006/relationships" xmlns:p="http://schemas.openxmlformats.org/presentationml/2006/main">
   <p:cSld>
     <p:spTree>
@@ -14497,10 +14645,17 @@
     <a:masterClrMapping/>
   </p:clrMapOvr>
   <p:transition xmlns:p14="http://schemas.microsoft.com/office/powerpoint/2010/main" spd="med"/>
+  <p:timing>
+    <p:tnLst>
+      <p:par>
+        <p:cTn xmlns:p14="http://schemas.microsoft.com/office/powerpoint/2010/main" id="1" dur="indefinite" restart="never" nodeType="tmRoot"/>
+      </p:par>
+    </p:tnLst>
+  </p:timing>
 </p:sld>
 </file>
 
-<file path=ppt/slides/slide26.xml><?xml version="1.0" encoding="utf-8"?>
+<file path=ppt/slides/slide27.xml><?xml version="1.0" encoding="utf-8"?>
 <p:sld xmlns:a="http://schemas.openxmlformats.org/drawingml/2006/main" xmlns:r="http://schemas.openxmlformats.org/officeDocument/2006/relationships" xmlns:p="http://schemas.openxmlformats.org/presentationml/2006/main">
   <p:cSld>
     <p:spTree>
@@ -14842,10 +14997,17 @@
     <a:masterClrMapping/>
   </p:clrMapOvr>
   <p:transition xmlns:p14="http://schemas.microsoft.com/office/powerpoint/2010/main" spd="med"/>
+  <p:timing>
+    <p:tnLst>
+      <p:par>
+        <p:cTn xmlns:p14="http://schemas.microsoft.com/office/powerpoint/2010/main" id="1" dur="indefinite" restart="never" nodeType="tmRoot"/>
+      </p:par>
+    </p:tnLst>
+  </p:timing>
 </p:sld>
 </file>
 
-<file path=ppt/slides/slide27.xml><?xml version="1.0" encoding="utf-8"?>
+<file path=ppt/slides/slide28.xml><?xml version="1.0" encoding="utf-8"?>
 <p:sld xmlns:a="http://schemas.openxmlformats.org/drawingml/2006/main" xmlns:r="http://schemas.openxmlformats.org/officeDocument/2006/relationships" xmlns:p="http://schemas.openxmlformats.org/presentationml/2006/main">
   <p:cSld>
     <p:spTree>
@@ -15129,10 +15291,17 @@
     <a:masterClrMapping/>
   </p:clrMapOvr>
   <p:transition xmlns:p14="http://schemas.microsoft.com/office/powerpoint/2010/main" spd="med"/>
+  <p:timing>
+    <p:tnLst>
+      <p:par>
+        <p:cTn xmlns:p14="http://schemas.microsoft.com/office/powerpoint/2010/main" id="1" dur="indefinite" restart="never" nodeType="tmRoot"/>
+      </p:par>
+    </p:tnLst>
+  </p:timing>
 </p:sld>
 </file>
 
-<file path=ppt/slides/slide28.xml><?xml version="1.0" encoding="utf-8"?>
+<file path=ppt/slides/slide29.xml><?xml version="1.0" encoding="utf-8"?>
 <p:sld xmlns:a="http://schemas.openxmlformats.org/drawingml/2006/main" xmlns:r="http://schemas.openxmlformats.org/officeDocument/2006/relationships" xmlns:p="http://schemas.openxmlformats.org/presentationml/2006/main">
   <p:cSld>
     <p:spTree>
@@ -16075,10 +16244,148 @@
     <a:masterClrMapping/>
   </p:clrMapOvr>
   <p:transition xmlns:p14="http://schemas.microsoft.com/office/powerpoint/2010/main" spd="med"/>
+  <p:timing>
+    <p:tnLst>
+      <p:par>
+        <p:cTn xmlns:p14="http://schemas.microsoft.com/office/powerpoint/2010/main" id="1" dur="indefinite" restart="never" nodeType="tmRoot"/>
+      </p:par>
+    </p:tnLst>
+  </p:timing>
 </p:sld>
 </file>
 
-<file path=ppt/slides/slide29.xml><?xml version="1.0" encoding="utf-8"?>
+<file path=ppt/slides/slide3.xml><?xml version="1.0" encoding="utf-8"?>
+<p:sld xmlns:a="http://schemas.openxmlformats.org/drawingml/2006/main" xmlns:r="http://schemas.openxmlformats.org/officeDocument/2006/relationships" xmlns:p="http://schemas.openxmlformats.org/presentationml/2006/main">
+  <p:cSld>
+    <p:spTree>
+      <p:nvGrpSpPr>
+        <p:cNvPr id="1" name=""/>
+        <p:cNvGrpSpPr/>
+        <p:nvPr/>
+      </p:nvGrpSpPr>
+      <p:grpSpPr>
+        <a:xfrm>
+          <a:off x="0" y="0"/>
+          <a:ext cx="0" cy="0"/>
+          <a:chOff x="0" y="0"/>
+          <a:chExt cx="0" cy="0"/>
+        </a:xfrm>
+      </p:grpSpPr>
+      <p:sp>
+        <p:nvSpPr>
+          <p:cNvPr id="2" name="Title 1"/>
+          <p:cNvSpPr>
+            <a:spLocks noGrp="1"/>
+          </p:cNvSpPr>
+          <p:nvPr>
+            <p:ph type="title"/>
+          </p:nvPr>
+        </p:nvSpPr>
+        <p:spPr>
+          <a:xfrm>
+            <a:off x="685800" y="2003615"/>
+            <a:ext cx="7772400" cy="719829"/>
+          </a:xfrm>
+        </p:spPr>
+        <p:txBody>
+          <a:bodyPr/>
+          <a:lstStyle/>
+          <a:p>
+            <a:r>
+              <a:rPr lang="en-US" dirty="0" smtClean="0">
+                <a:solidFill>
+                  <a:srgbClr val="28B2CB"/>
+                </a:solidFill>
+                <a:uFill>
+                  <a:solidFill>
+                    <a:srgbClr val="28B2CB"/>
+                  </a:solidFill>
+                </a:uFill>
+              </a:rPr>
+              <a:t>Who am I?</a:t>
+            </a:r>
+            <a:endParaRPr lang="en-US" dirty="0"/>
+          </a:p>
+        </p:txBody>
+      </p:sp>
+      <p:sp>
+        <p:nvSpPr>
+          <p:cNvPr id="3" name="Text Placeholder 2"/>
+          <p:cNvSpPr>
+            <a:spLocks noGrp="1"/>
+          </p:cNvSpPr>
+          <p:nvPr>
+            <p:ph type="body" idx="1"/>
+          </p:nvPr>
+        </p:nvSpPr>
+        <p:spPr>
+          <a:xfrm>
+            <a:off x="1371600" y="3262338"/>
+            <a:ext cx="6400800" cy="3426329"/>
+          </a:xfrm>
+        </p:spPr>
+        <p:txBody>
+          <a:bodyPr/>
+          <a:lstStyle/>
+          <a:p>
+            <a:r>
+              <a:rPr lang="en-US" dirty="0" smtClean="0"/>
+              <a:t>Philipp Fehre - Developer Advocate</a:t>
+            </a:r>
+          </a:p>
+          <a:p>
+            <a:r>
+              <a:rPr lang="en-US" dirty="0" smtClean="0"/>
+              <a:t>Twitter: @</a:t>
+            </a:r>
+            <a:r>
+              <a:rPr lang="en-US" dirty="0" err="1" smtClean="0"/>
+              <a:t>ischi</a:t>
+            </a:r>
+            <a:r>
+              <a:rPr lang="en-US" dirty="0"/>
+              <a:t> </a:t>
+            </a:r>
+            <a:r>
+              <a:rPr lang="en-US" dirty="0" smtClean="0"/>
+              <a:t>Github: </a:t>
+            </a:r>
+            <a:r>
+              <a:rPr lang="en-US" dirty="0" err="1" smtClean="0"/>
+              <a:t>sideshowcoder</a:t>
+            </a:r>
+            <a:endParaRPr lang="en-US" dirty="0"/>
+          </a:p>
+          <a:p>
+            <a:endParaRPr lang="en-US" dirty="0"/>
+          </a:p>
+          <a:p>
+            <a:endParaRPr lang="en-US" dirty="0"/>
+          </a:p>
+        </p:txBody>
+      </p:sp>
+    </p:spTree>
+    <p:extLst>
+      <p:ext uri="{BB962C8B-B14F-4D97-AF65-F5344CB8AC3E}">
+        <p14:creationId xmlns:p14="http://schemas.microsoft.com/office/powerpoint/2010/main" val="2102251474"/>
+      </p:ext>
+    </p:extLst>
+  </p:cSld>
+  <p:clrMapOvr>
+    <a:masterClrMapping/>
+  </p:clrMapOvr>
+  <p:transition xmlns:p14="http://schemas.microsoft.com/office/powerpoint/2010/main" spd="med"/>
+  <p:timing>
+    <p:tnLst>
+      <p:par>
+        <p:cTn xmlns:p14="http://schemas.microsoft.com/office/powerpoint/2010/main" id="1" dur="indefinite" restart="never" nodeType="tmRoot"/>
+      </p:par>
+    </p:tnLst>
+  </p:timing>
+</p:sld>
+</file>
+
+<file path=ppt/slides/slide30.xml><?xml version="1.0" encoding="utf-8"?>
 <p:sld xmlns:a="http://schemas.openxmlformats.org/drawingml/2006/main" xmlns:r="http://schemas.openxmlformats.org/officeDocument/2006/relationships" xmlns:p="http://schemas.openxmlformats.org/presentationml/2006/main">
   <p:cSld>
     <p:spTree>
@@ -16972,7 +17279,7 @@
                   </a:solidFill>
                 </a:uFill>
               </a:rPr>
-              <a:t>29</a:t>
+              <a:t>30</a:t>
             </a:fld>
             <a:endParaRPr sz="1200">
               <a:solidFill>
@@ -16988,138 +17295,6 @@
         </p:txBody>
       </p:sp>
     </p:spTree>
-  </p:cSld>
-  <p:clrMapOvr>
-    <a:masterClrMapping/>
-  </p:clrMapOvr>
-  <p:transition xmlns:p14="http://schemas.microsoft.com/office/powerpoint/2010/main" spd="med"/>
-</p:sld>
-</file>
-
-<file path=ppt/slides/slide3.xml><?xml version="1.0" encoding="utf-8"?>
-<p:sld xmlns:a="http://schemas.openxmlformats.org/drawingml/2006/main" xmlns:r="http://schemas.openxmlformats.org/officeDocument/2006/relationships" xmlns:p="http://schemas.openxmlformats.org/presentationml/2006/main">
-  <p:cSld>
-    <p:spTree>
-      <p:nvGrpSpPr>
-        <p:cNvPr id="1" name=""/>
-        <p:cNvGrpSpPr/>
-        <p:nvPr/>
-      </p:nvGrpSpPr>
-      <p:grpSpPr>
-        <a:xfrm>
-          <a:off x="0" y="0"/>
-          <a:ext cx="0" cy="0"/>
-          <a:chOff x="0" y="0"/>
-          <a:chExt cx="0" cy="0"/>
-        </a:xfrm>
-      </p:grpSpPr>
-      <p:sp>
-        <p:nvSpPr>
-          <p:cNvPr id="2" name="Title 1"/>
-          <p:cNvSpPr>
-            <a:spLocks noGrp="1"/>
-          </p:cNvSpPr>
-          <p:nvPr>
-            <p:ph type="title"/>
-          </p:nvPr>
-        </p:nvSpPr>
-        <p:spPr>
-          <a:xfrm>
-            <a:off x="685800" y="2003615"/>
-            <a:ext cx="7772400" cy="719829"/>
-          </a:xfrm>
-        </p:spPr>
-        <p:txBody>
-          <a:bodyPr/>
-          <a:lstStyle/>
-          <a:p>
-            <a:r>
-              <a:rPr lang="en-US" dirty="0" smtClean="0">
-                <a:solidFill>
-                  <a:srgbClr val="28B2CB"/>
-                </a:solidFill>
-                <a:uFill>
-                  <a:solidFill>
-                    <a:srgbClr val="28B2CB"/>
-                  </a:solidFill>
-                </a:uFill>
-              </a:rPr>
-              <a:t>Who am I?</a:t>
-            </a:r>
-            <a:endParaRPr lang="en-US" dirty="0"/>
-          </a:p>
-        </p:txBody>
-      </p:sp>
-      <p:sp>
-        <p:nvSpPr>
-          <p:cNvPr id="3" name="Text Placeholder 2"/>
-          <p:cNvSpPr>
-            <a:spLocks noGrp="1"/>
-          </p:cNvSpPr>
-          <p:nvPr>
-            <p:ph type="body" idx="1"/>
-          </p:nvPr>
-        </p:nvSpPr>
-        <p:spPr>
-          <a:xfrm>
-            <a:off x="1371600" y="3262338"/>
-            <a:ext cx="6400800" cy="3426329"/>
-          </a:xfrm>
-        </p:spPr>
-        <p:txBody>
-          <a:bodyPr/>
-          <a:lstStyle/>
-          <a:p>
-            <a:r>
-              <a:rPr lang="en-US" dirty="0" smtClean="0"/>
-              <a:t>Philipp </a:t>
-            </a:r>
-            <a:r>
-              <a:rPr lang="en-US" dirty="0" smtClean="0"/>
-              <a:t>Fehre - Developer Advocate</a:t>
-            </a:r>
-          </a:p>
-          <a:p>
-            <a:r>
-              <a:rPr lang="en-US" dirty="0" smtClean="0"/>
-              <a:t>Twitter: @</a:t>
-            </a:r>
-            <a:r>
-              <a:rPr lang="en-US" dirty="0" err="1" smtClean="0"/>
-              <a:t>ischi</a:t>
-            </a:r>
-            <a:r>
-              <a:rPr lang="en-US" dirty="0"/>
-              <a:t> </a:t>
-            </a:r>
-            <a:r>
-              <a:rPr lang="en-US" dirty="0" smtClean="0"/>
-              <a:t>G</a:t>
-            </a:r>
-            <a:r>
-              <a:rPr lang="en-US" dirty="0" smtClean="0"/>
-              <a:t>ithub: </a:t>
-            </a:r>
-            <a:r>
-              <a:rPr lang="en-US" dirty="0" err="1" smtClean="0"/>
-              <a:t>sideshowcoder</a:t>
-            </a:r>
-            <a:endParaRPr lang="en-US" dirty="0"/>
-          </a:p>
-          <a:p>
-            <a:endParaRPr lang="en-US" dirty="0"/>
-          </a:p>
-          <a:p>
-            <a:endParaRPr lang="en-US" dirty="0"/>
-          </a:p>
-        </p:txBody>
-      </p:sp>
-    </p:spTree>
-    <p:extLst>
-      <p:ext uri="{BB962C8B-B14F-4D97-AF65-F5344CB8AC3E}">
-        <p14:creationId xmlns:p14="http://schemas.microsoft.com/office/powerpoint/2010/main" val="2102251474"/>
-      </p:ext>
-    </p:extLst>
   </p:cSld>
   <p:clrMapOvr>
     <a:masterClrMapping/>
@@ -17135,7 +17310,7 @@
 </p:sld>
 </file>
 
-<file path=ppt/slides/slide30.xml><?xml version="1.0" encoding="utf-8"?>
+<file path=ppt/slides/slide31.xml><?xml version="1.0" encoding="utf-8"?>
 <p:sld xmlns:a="http://schemas.openxmlformats.org/drawingml/2006/main" xmlns:r="http://schemas.openxmlformats.org/officeDocument/2006/relationships" xmlns:p="http://schemas.openxmlformats.org/presentationml/2006/main">
   <p:cSld>
     <p:spTree>
@@ -17292,7 +17467,7 @@
                   </a:solidFill>
                 </a:uFill>
               </a:rPr>
-              <a:t>30</a:t>
+              <a:t>31</a:t>
             </a:fld>
             <a:endParaRPr sz="1200">
               <a:solidFill>
@@ -17313,10 +17488,17 @@
     <a:masterClrMapping/>
   </p:clrMapOvr>
   <p:transition xmlns:p14="http://schemas.microsoft.com/office/powerpoint/2010/main" spd="med"/>
+  <p:timing>
+    <p:tnLst>
+      <p:par>
+        <p:cTn xmlns:p14="http://schemas.microsoft.com/office/powerpoint/2010/main" id="1" dur="indefinite" restart="never" nodeType="tmRoot"/>
+      </p:par>
+    </p:tnLst>
+  </p:timing>
 </p:sld>
 </file>
 
-<file path=ppt/slides/slide31.xml><?xml version="1.0" encoding="utf-8"?>
+<file path=ppt/slides/slide32.xml><?xml version="1.0" encoding="utf-8"?>
 <p:sld xmlns:a="http://schemas.openxmlformats.org/drawingml/2006/main" xmlns:r="http://schemas.openxmlformats.org/officeDocument/2006/relationships" xmlns:p="http://schemas.openxmlformats.org/presentationml/2006/main">
   <p:cSld>
     <p:spTree>
@@ -17476,7 +17658,7 @@
                   </a:solidFill>
                 </a:uFill>
               </a:rPr>
-              <a:t>31</a:t>
+              <a:t>32</a:t>
             </a:fld>
             <a:endParaRPr sz="1200">
               <a:solidFill>
@@ -17497,10 +17679,17 @@
     <a:masterClrMapping/>
   </p:clrMapOvr>
   <p:transition xmlns:p14="http://schemas.microsoft.com/office/powerpoint/2010/main" spd="med"/>
+  <p:timing>
+    <p:tnLst>
+      <p:par>
+        <p:cTn xmlns:p14="http://schemas.microsoft.com/office/powerpoint/2010/main" id="1" dur="indefinite" restart="never" nodeType="tmRoot"/>
+      </p:par>
+    </p:tnLst>
+  </p:timing>
 </p:sld>
 </file>
 
-<file path=ppt/slides/slide32.xml><?xml version="1.0" encoding="utf-8"?>
+<file path=ppt/slides/slide33.xml><?xml version="1.0" encoding="utf-8"?>
 <p:sld xmlns:a="http://schemas.openxmlformats.org/drawingml/2006/main" xmlns:r="http://schemas.openxmlformats.org/officeDocument/2006/relationships" xmlns:p="http://schemas.openxmlformats.org/presentationml/2006/main">
   <p:cSld>
     <p:spTree>
@@ -18259,10 +18448,17 @@
     <a:masterClrMapping/>
   </p:clrMapOvr>
   <p:transition xmlns:p14="http://schemas.microsoft.com/office/powerpoint/2010/main" spd="med"/>
+  <p:timing>
+    <p:tnLst>
+      <p:par>
+        <p:cTn xmlns:p14="http://schemas.microsoft.com/office/powerpoint/2010/main" id="1" dur="indefinite" restart="never" nodeType="tmRoot"/>
+      </p:par>
+    </p:tnLst>
+  </p:timing>
 </p:sld>
 </file>
 
-<file path=ppt/slides/slide33.xml><?xml version="1.0" encoding="utf-8"?>
+<file path=ppt/slides/slide34.xml><?xml version="1.0" encoding="utf-8"?>
 <p:sld xmlns:a="http://schemas.openxmlformats.org/drawingml/2006/main" xmlns:r="http://schemas.openxmlformats.org/officeDocument/2006/relationships" xmlns:p="http://schemas.openxmlformats.org/presentationml/2006/main">
   <p:cSld>
     <p:spTree>
@@ -18381,10 +18577,17 @@
     <a:masterClrMapping/>
   </p:clrMapOvr>
   <p:transition xmlns:p14="http://schemas.microsoft.com/office/powerpoint/2010/main" spd="med"/>
+  <p:timing>
+    <p:tnLst>
+      <p:par>
+        <p:cTn xmlns:p14="http://schemas.microsoft.com/office/powerpoint/2010/main" id="1" dur="indefinite" restart="never" nodeType="tmRoot"/>
+      </p:par>
+    </p:tnLst>
+  </p:timing>
 </p:sld>
 </file>
 
-<file path=ppt/slides/slide34.xml><?xml version="1.0" encoding="utf-8"?>
+<file path=ppt/slides/slide35.xml><?xml version="1.0" encoding="utf-8"?>
 <p:sld xmlns:a="http://schemas.openxmlformats.org/drawingml/2006/main" xmlns:r="http://schemas.openxmlformats.org/officeDocument/2006/relationships" xmlns:p="http://schemas.openxmlformats.org/presentationml/2006/main">
   <p:cSld>
     <p:spTree>
@@ -18941,10 +19144,17 @@
     <a:masterClrMapping/>
   </p:clrMapOvr>
   <p:transition xmlns:p14="http://schemas.microsoft.com/office/powerpoint/2010/main" spd="med"/>
+  <p:timing>
+    <p:tnLst>
+      <p:par>
+        <p:cTn xmlns:p14="http://schemas.microsoft.com/office/powerpoint/2010/main" id="1" dur="indefinite" restart="never" nodeType="tmRoot"/>
+      </p:par>
+    </p:tnLst>
+  </p:timing>
 </p:sld>
 </file>
 
-<file path=ppt/slides/slide35.xml><?xml version="1.0" encoding="utf-8"?>
+<file path=ppt/slides/slide36.xml><?xml version="1.0" encoding="utf-8"?>
 <p:sld xmlns:a="http://schemas.openxmlformats.org/drawingml/2006/main" xmlns:r="http://schemas.openxmlformats.org/officeDocument/2006/relationships" xmlns:p="http://schemas.openxmlformats.org/presentationml/2006/main">
   <p:cSld>
     <p:spTree>
@@ -19705,10 +19915,17 @@
     <a:masterClrMapping/>
   </p:clrMapOvr>
   <p:transition xmlns:p14="http://schemas.microsoft.com/office/powerpoint/2010/main" spd="med"/>
+  <p:timing>
+    <p:tnLst>
+      <p:par>
+        <p:cTn xmlns:p14="http://schemas.microsoft.com/office/powerpoint/2010/main" id="1" dur="indefinite" restart="never" nodeType="tmRoot"/>
+      </p:par>
+    </p:tnLst>
+  </p:timing>
 </p:sld>
 </file>
 
-<file path=ppt/slides/slide36.xml><?xml version="1.0" encoding="utf-8"?>
+<file path=ppt/slides/slide37.xml><?xml version="1.0" encoding="utf-8"?>
 <p:sld xmlns:a="http://schemas.openxmlformats.org/drawingml/2006/main" xmlns:r="http://schemas.openxmlformats.org/officeDocument/2006/relationships" xmlns:p="http://schemas.openxmlformats.org/presentationml/2006/main">
   <p:cSld>
     <p:spTree>
@@ -19814,10 +20031,17 @@
     <a:masterClrMapping/>
   </p:clrMapOvr>
   <p:transition xmlns:p14="http://schemas.microsoft.com/office/powerpoint/2010/main" spd="med"/>
+  <p:timing>
+    <p:tnLst>
+      <p:par>
+        <p:cTn xmlns:p14="http://schemas.microsoft.com/office/powerpoint/2010/main" id="1" dur="indefinite" restart="never" nodeType="tmRoot"/>
+      </p:par>
+    </p:tnLst>
+  </p:timing>
 </p:sld>
 </file>
 
-<file path=ppt/slides/slide37.xml><?xml version="1.0" encoding="utf-8"?>
+<file path=ppt/slides/slide38.xml><?xml version="1.0" encoding="utf-8"?>
 <p:sld xmlns:a="http://schemas.openxmlformats.org/drawingml/2006/main" xmlns:r="http://schemas.openxmlformats.org/officeDocument/2006/relationships" xmlns:p="http://schemas.openxmlformats.org/presentationml/2006/main">
   <p:cSld>
     <p:spTree>
@@ -21622,10 +21846,17 @@
     <a:masterClrMapping/>
   </p:clrMapOvr>
   <p:transition xmlns:p14="http://schemas.microsoft.com/office/powerpoint/2010/main" spd="med"/>
+  <p:timing>
+    <p:tnLst>
+      <p:par>
+        <p:cTn xmlns:p14="http://schemas.microsoft.com/office/powerpoint/2010/main" id="1" dur="indefinite" restart="never" nodeType="tmRoot"/>
+      </p:par>
+    </p:tnLst>
+  </p:timing>
 </p:sld>
 </file>
 
-<file path=ppt/slides/slide38.xml><?xml version="1.0" encoding="utf-8"?>
+<file path=ppt/slides/slide39.xml><?xml version="1.0" encoding="utf-8"?>
 <p:sld xmlns:a="http://schemas.openxmlformats.org/drawingml/2006/main" xmlns:r="http://schemas.openxmlformats.org/officeDocument/2006/relationships" xmlns:p="http://schemas.openxmlformats.org/presentationml/2006/main">
   <p:cSld>
     <p:spTree>
@@ -22313,138 +22544,13 @@
     <a:masterClrMapping/>
   </p:clrMapOvr>
   <p:transition xmlns:p14="http://schemas.microsoft.com/office/powerpoint/2010/main" spd="med"/>
-</p:sld>
-</file>
-
-<file path=ppt/slides/slide39.xml><?xml version="1.0" encoding="utf-8"?>
-<p:sld xmlns:a="http://schemas.openxmlformats.org/drawingml/2006/main" xmlns:r="http://schemas.openxmlformats.org/officeDocument/2006/relationships" xmlns:p="http://schemas.openxmlformats.org/presentationml/2006/main">
-  <p:cSld>
-    <p:spTree>
-      <p:nvGrpSpPr>
-        <p:cNvPr id="1" name=""/>
-        <p:cNvGrpSpPr/>
-        <p:nvPr/>
-      </p:nvGrpSpPr>
-      <p:grpSpPr>
-        <a:xfrm>
-          <a:off x="0" y="0"/>
-          <a:ext cx="0" cy="0"/>
-          <a:chOff x="0" y="0"/>
-          <a:chExt cx="0" cy="0"/>
-        </a:xfrm>
-      </p:grpSpPr>
-      <p:sp>
-        <p:nvSpPr>
-          <p:cNvPr id="297" name="Shape 297"/>
-          <p:cNvSpPr>
-            <a:spLocks noGrp="1"/>
-          </p:cNvSpPr>
-          <p:nvPr>
-            <p:ph type="title"/>
-          </p:nvPr>
-        </p:nvSpPr>
-        <p:spPr>
-          <a:xfrm>
-            <a:off x="685800" y="2111123"/>
-            <a:ext cx="7772400" cy="1546400"/>
-          </a:xfrm>
-          <a:prstGeom prst="rect">
-            <a:avLst/>
-          </a:prstGeom>
-        </p:spPr>
-        <p:txBody>
-          <a:bodyPr>
-            <a:normAutofit/>
-          </a:bodyPr>
-          <a:lstStyle/>
-          <a:p>
-            <a:pPr lvl="0">
-              <a:defRPr sz="1800" b="0">
-                <a:solidFill>
-                  <a:srgbClr val="000000"/>
-                </a:solidFill>
-                <a:uFillTx/>
-              </a:defRPr>
-            </a:pPr>
-            <a:r>
-              <a:rPr sz="4800" b="1">
-                <a:solidFill>
-                  <a:srgbClr val="3F3F3F"/>
-                </a:solidFill>
-                <a:uFill>
-                  <a:solidFill>
-                    <a:srgbClr val="3F3F3F"/>
-                  </a:solidFill>
-                </a:uFill>
-              </a:rPr>
-              <a:t>Consistent Data</a:t>
-            </a:r>
-          </a:p>
-        </p:txBody>
-      </p:sp>
-      <p:sp>
-        <p:nvSpPr>
-          <p:cNvPr id="298" name="Shape 298"/>
-          <p:cNvSpPr>
-            <a:spLocks noGrp="1"/>
-          </p:cNvSpPr>
-          <p:nvPr>
-            <p:ph type="body" idx="1"/>
-          </p:nvPr>
-        </p:nvSpPr>
-        <p:spPr>
-          <a:xfrm>
-            <a:off x="685800" y="3786737"/>
-            <a:ext cx="7772400" cy="1046400"/>
-          </a:xfrm>
-          <a:prstGeom prst="rect">
-            <a:avLst/>
-          </a:prstGeom>
-        </p:spPr>
-        <p:txBody>
-          <a:bodyPr/>
-          <a:lstStyle/>
-          <a:p>
-            <a:pPr lvl="0">
-              <a:defRPr sz="1800" b="0">
-                <a:solidFill>
-                  <a:srgbClr val="000000"/>
-                </a:solidFill>
-                <a:uFillTx/>
-              </a:defRPr>
-            </a:pPr>
-            <a:r>
-              <a:rPr lang="en-US" sz="2400" b="1" dirty="0" smtClean="0">
-                <a:solidFill>
-                  <a:srgbClr val="404040"/>
-                </a:solidFill>
-                <a:uFill>
-                  <a:solidFill>
-                    <a:srgbClr val="404040"/>
-                  </a:solidFill>
-                </a:uFill>
-              </a:rPr>
-              <a:t>No merging or quorum read needed</a:t>
-            </a:r>
-            <a:endParaRPr sz="2400" b="1" dirty="0">
-              <a:solidFill>
-                <a:srgbClr val="404040"/>
-              </a:solidFill>
-              <a:uFill>
-                <a:solidFill>
-                  <a:srgbClr val="404040"/>
-                </a:solidFill>
-              </a:uFill>
-            </a:endParaRPr>
-          </a:p>
-        </p:txBody>
-      </p:sp>
-    </p:spTree>
-  </p:cSld>
-  <p:clrMapOvr>
-    <a:masterClrMapping/>
-  </p:clrMapOvr>
-  <p:transition xmlns:p14="http://schemas.microsoft.com/office/powerpoint/2010/main" spd="med"/>
+  <p:timing>
+    <p:tnLst>
+      <p:par>
+        <p:cTn xmlns:p14="http://schemas.microsoft.com/office/powerpoint/2010/main" id="1" dur="indefinite" restart="never" nodeType="tmRoot"/>
+      </p:par>
+    </p:tnLst>
+  </p:timing>
 </p:sld>
 </file>
 
@@ -22561,6 +22667,145 @@
       </p:grpSpPr>
       <p:sp>
         <p:nvSpPr>
+          <p:cNvPr id="297" name="Shape 297"/>
+          <p:cNvSpPr>
+            <a:spLocks noGrp="1"/>
+          </p:cNvSpPr>
+          <p:nvPr>
+            <p:ph type="title"/>
+          </p:nvPr>
+        </p:nvSpPr>
+        <p:spPr>
+          <a:xfrm>
+            <a:off x="685800" y="2111123"/>
+            <a:ext cx="7772400" cy="1546400"/>
+          </a:xfrm>
+          <a:prstGeom prst="rect">
+            <a:avLst/>
+          </a:prstGeom>
+        </p:spPr>
+        <p:txBody>
+          <a:bodyPr>
+            <a:normAutofit/>
+          </a:bodyPr>
+          <a:lstStyle/>
+          <a:p>
+            <a:pPr lvl="0">
+              <a:defRPr sz="1800" b="0">
+                <a:solidFill>
+                  <a:srgbClr val="000000"/>
+                </a:solidFill>
+                <a:uFillTx/>
+              </a:defRPr>
+            </a:pPr>
+            <a:r>
+              <a:rPr sz="4800" b="1">
+                <a:solidFill>
+                  <a:srgbClr val="3F3F3F"/>
+                </a:solidFill>
+                <a:uFill>
+                  <a:solidFill>
+                    <a:srgbClr val="3F3F3F"/>
+                  </a:solidFill>
+                </a:uFill>
+              </a:rPr>
+              <a:t>Consistent Data</a:t>
+            </a:r>
+          </a:p>
+        </p:txBody>
+      </p:sp>
+      <p:sp>
+        <p:nvSpPr>
+          <p:cNvPr id="298" name="Shape 298"/>
+          <p:cNvSpPr>
+            <a:spLocks noGrp="1"/>
+          </p:cNvSpPr>
+          <p:nvPr>
+            <p:ph type="body" idx="1"/>
+          </p:nvPr>
+        </p:nvSpPr>
+        <p:spPr>
+          <a:xfrm>
+            <a:off x="685800" y="3786737"/>
+            <a:ext cx="7772400" cy="1046400"/>
+          </a:xfrm>
+          <a:prstGeom prst="rect">
+            <a:avLst/>
+          </a:prstGeom>
+        </p:spPr>
+        <p:txBody>
+          <a:bodyPr/>
+          <a:lstStyle/>
+          <a:p>
+            <a:pPr lvl="0">
+              <a:defRPr sz="1800" b="0">
+                <a:solidFill>
+                  <a:srgbClr val="000000"/>
+                </a:solidFill>
+                <a:uFillTx/>
+              </a:defRPr>
+            </a:pPr>
+            <a:r>
+              <a:rPr lang="en-US" sz="2400" b="1" dirty="0" smtClean="0">
+                <a:solidFill>
+                  <a:srgbClr val="404040"/>
+                </a:solidFill>
+                <a:uFill>
+                  <a:solidFill>
+                    <a:srgbClr val="404040"/>
+                  </a:solidFill>
+                </a:uFill>
+              </a:rPr>
+              <a:t>No merging or quorum read needed</a:t>
+            </a:r>
+            <a:endParaRPr sz="2400" b="1" dirty="0">
+              <a:solidFill>
+                <a:srgbClr val="404040"/>
+              </a:solidFill>
+              <a:uFill>
+                <a:solidFill>
+                  <a:srgbClr val="404040"/>
+                </a:solidFill>
+              </a:uFill>
+            </a:endParaRPr>
+          </a:p>
+        </p:txBody>
+      </p:sp>
+    </p:spTree>
+  </p:cSld>
+  <p:clrMapOvr>
+    <a:masterClrMapping/>
+  </p:clrMapOvr>
+  <p:transition xmlns:p14="http://schemas.microsoft.com/office/powerpoint/2010/main" spd="med"/>
+  <p:timing>
+    <p:tnLst>
+      <p:par>
+        <p:cTn xmlns:p14="http://schemas.microsoft.com/office/powerpoint/2010/main" id="1" dur="indefinite" restart="never" nodeType="tmRoot"/>
+      </p:par>
+    </p:tnLst>
+  </p:timing>
+</p:sld>
+</file>
+
+<file path=ppt/slides/slide41.xml><?xml version="1.0" encoding="utf-8"?>
+<p:sld xmlns:a="http://schemas.openxmlformats.org/drawingml/2006/main" xmlns:r="http://schemas.openxmlformats.org/officeDocument/2006/relationships" xmlns:p="http://schemas.openxmlformats.org/presentationml/2006/main">
+  <p:cSld>
+    <p:spTree>
+      <p:nvGrpSpPr>
+        <p:cNvPr id="1" name=""/>
+        <p:cNvGrpSpPr/>
+        <p:nvPr/>
+      </p:nvGrpSpPr>
+      <p:grpSpPr>
+        <a:xfrm>
+          <a:off x="0" y="0"/>
+          <a:ext cx="0" cy="0"/>
+          <a:chOff x="0" y="0"/>
+          <a:chExt cx="0" cy="0"/>
+        </a:xfrm>
+      </p:grpSpPr>
+      <p:sp>
+        <p:nvSpPr>
           <p:cNvPr id="301" name="Shape 301"/>
           <p:cNvSpPr>
             <a:spLocks noGrp="1"/>
@@ -22608,10 +22853,17 @@
     <a:masterClrMapping/>
   </p:clrMapOvr>
   <p:transition xmlns:p14="http://schemas.microsoft.com/office/powerpoint/2010/main" spd="med"/>
+  <p:timing>
+    <p:tnLst>
+      <p:par>
+        <p:cTn xmlns:p14="http://schemas.microsoft.com/office/powerpoint/2010/main" id="1" dur="indefinite" restart="never" nodeType="tmRoot"/>
+      </p:par>
+    </p:tnLst>
+  </p:timing>
 </p:sld>
 </file>
 
-<file path=ppt/slides/slide41.xml><?xml version="1.0" encoding="utf-8"?>
+<file path=ppt/slides/slide42.xml><?xml version="1.0" encoding="utf-8"?>
 <p:sld xmlns:a="http://schemas.openxmlformats.org/drawingml/2006/main" xmlns:r="http://schemas.openxmlformats.org/officeDocument/2006/relationships" xmlns:p="http://schemas.openxmlformats.org/presentationml/2006/main">
   <p:cSld>
     <p:spTree>
@@ -22768,10 +23020,17 @@
     <a:masterClrMapping/>
   </p:clrMapOvr>
   <p:transition xmlns:p14="http://schemas.microsoft.com/office/powerpoint/2010/main" spd="med"/>
+  <p:timing>
+    <p:tnLst>
+      <p:par>
+        <p:cTn xmlns:p14="http://schemas.microsoft.com/office/powerpoint/2010/main" id="1" dur="indefinite" restart="never" nodeType="tmRoot"/>
+      </p:par>
+    </p:tnLst>
+  </p:timing>
 </p:sld>
 </file>
 
-<file path=ppt/slides/slide42.xml><?xml version="1.0" encoding="utf-8"?>
+<file path=ppt/slides/slide43.xml><?xml version="1.0" encoding="utf-8"?>
 <p:sld xmlns:a="http://schemas.openxmlformats.org/drawingml/2006/main" xmlns:r="http://schemas.openxmlformats.org/officeDocument/2006/relationships" xmlns:p="http://schemas.openxmlformats.org/presentationml/2006/main">
   <p:cSld>
     <p:spTree>
@@ -22887,10 +23146,17 @@
     <a:masterClrMapping/>
   </p:clrMapOvr>
   <p:transition xmlns:p14="http://schemas.microsoft.com/office/powerpoint/2010/main" spd="med"/>
+  <p:timing>
+    <p:tnLst>
+      <p:par>
+        <p:cTn xmlns:p14="http://schemas.microsoft.com/office/powerpoint/2010/main" id="1" dur="indefinite" restart="never" nodeType="tmRoot"/>
+      </p:par>
+    </p:tnLst>
+  </p:timing>
 </p:sld>
 </file>
 
-<file path=ppt/slides/slide43.xml><?xml version="1.0" encoding="utf-8"?>
+<file path=ppt/slides/slide44.xml><?xml version="1.0" encoding="utf-8"?>
 <p:sld xmlns:a="http://schemas.openxmlformats.org/drawingml/2006/main" xmlns:r="http://schemas.openxmlformats.org/officeDocument/2006/relationships" xmlns:p="http://schemas.openxmlformats.org/presentationml/2006/main">
   <p:cSld>
     <p:spTree>
@@ -22956,10 +23222,17 @@
     <a:masterClrMapping/>
   </p:clrMapOvr>
   <p:transition xmlns:p14="http://schemas.microsoft.com/office/powerpoint/2010/main" spd="med"/>
+  <p:timing>
+    <p:tnLst>
+      <p:par>
+        <p:cTn xmlns:p14="http://schemas.microsoft.com/office/powerpoint/2010/main" id="1" dur="indefinite" restart="never" nodeType="tmRoot"/>
+      </p:par>
+    </p:tnLst>
+  </p:timing>
 </p:sld>
 </file>
 
-<file path=ppt/slides/slide44.xml><?xml version="1.0" encoding="utf-8"?>
+<file path=ppt/slides/slide45.xml><?xml version="1.0" encoding="utf-8"?>
 <p:sld xmlns:a="http://schemas.openxmlformats.org/drawingml/2006/main" xmlns:r="http://schemas.openxmlformats.org/officeDocument/2006/relationships" xmlns:p="http://schemas.openxmlformats.org/presentationml/2006/main">
   <p:cSld>
     <p:spTree>
@@ -23075,10 +23348,17 @@
     <a:masterClrMapping/>
   </p:clrMapOvr>
   <p:transition xmlns:p14="http://schemas.microsoft.com/office/powerpoint/2010/main" spd="med"/>
+  <p:timing>
+    <p:tnLst>
+      <p:par>
+        <p:cTn xmlns:p14="http://schemas.microsoft.com/office/powerpoint/2010/main" id="1" dur="indefinite" restart="never" nodeType="tmRoot"/>
+      </p:par>
+    </p:tnLst>
+  </p:timing>
 </p:sld>
 </file>
 
-<file path=ppt/slides/slide45.xml><?xml version="1.0" encoding="utf-8"?>
+<file path=ppt/slides/slide46.xml><?xml version="1.0" encoding="utf-8"?>
 <p:sld xmlns:a="http://schemas.openxmlformats.org/drawingml/2006/main" xmlns:r="http://schemas.openxmlformats.org/officeDocument/2006/relationships" xmlns:p="http://schemas.openxmlformats.org/presentationml/2006/main">
   <p:cSld>
     <p:spTree>
@@ -23209,10 +23489,17 @@
     <a:masterClrMapping/>
   </p:clrMapOvr>
   <p:transition xmlns:p14="http://schemas.microsoft.com/office/powerpoint/2010/main" spd="med"/>
+  <p:timing>
+    <p:tnLst>
+      <p:par>
+        <p:cTn xmlns:p14="http://schemas.microsoft.com/office/powerpoint/2010/main" id="1" dur="indefinite" restart="never" nodeType="tmRoot"/>
+      </p:par>
+    </p:tnLst>
+  </p:timing>
 </p:sld>
 </file>
 
-<file path=ppt/slides/slide46.xml><?xml version="1.0" encoding="utf-8"?>
+<file path=ppt/slides/slide47.xml><?xml version="1.0" encoding="utf-8"?>
 <p:sld xmlns:a="http://schemas.openxmlformats.org/drawingml/2006/main" xmlns:r="http://schemas.openxmlformats.org/officeDocument/2006/relationships" xmlns:p="http://schemas.openxmlformats.org/presentationml/2006/main">
   <p:cSld>
     <p:spTree>
@@ -24235,7 +24522,7 @@
 </p:sld>
 </file>
 
-<file path=ppt/slides/slide47.xml><?xml version="1.0" encoding="utf-8"?>
+<file path=ppt/slides/slide48.xml><?xml version="1.0" encoding="utf-8"?>
 <p:sld xmlns:a="http://schemas.openxmlformats.org/drawingml/2006/main" xmlns:r="http://schemas.openxmlformats.org/officeDocument/2006/relationships" xmlns:p="http://schemas.openxmlformats.org/presentationml/2006/main">
   <p:cSld>
     <p:spTree>
@@ -24984,10 +25271,17 @@
     <a:masterClrMapping/>
   </p:clrMapOvr>
   <p:transition xmlns:p14="http://schemas.microsoft.com/office/powerpoint/2010/main" spd="med"/>
+  <p:timing>
+    <p:tnLst>
+      <p:par>
+        <p:cTn xmlns:p14="http://schemas.microsoft.com/office/powerpoint/2010/main" id="1" dur="indefinite" restart="never" nodeType="tmRoot"/>
+      </p:par>
+    </p:tnLst>
+  </p:timing>
 </p:sld>
 </file>
 
-<file path=ppt/slides/slide48.xml><?xml version="1.0" encoding="utf-8"?>
+<file path=ppt/slides/slide49.xml><?xml version="1.0" encoding="utf-8"?>
 <p:sld xmlns:a="http://schemas.openxmlformats.org/drawingml/2006/main" xmlns:r="http://schemas.openxmlformats.org/officeDocument/2006/relationships" xmlns:p="http://schemas.openxmlformats.org/presentationml/2006/main">
   <p:cSld>
     <p:spTree>
@@ -25571,109 +25865,13 @@
     <a:masterClrMapping/>
   </p:clrMapOvr>
   <p:transition xmlns:p14="http://schemas.microsoft.com/office/powerpoint/2010/main" spd="med"/>
-</p:sld>
-</file>
-
-<file path=ppt/slides/slide49.xml><?xml version="1.0" encoding="utf-8"?>
-<p:sld xmlns:a="http://schemas.openxmlformats.org/drawingml/2006/main" xmlns:r="http://schemas.openxmlformats.org/officeDocument/2006/relationships" xmlns:p="http://schemas.openxmlformats.org/presentationml/2006/main">
-  <p:cSld>
-    <p:spTree>
-      <p:nvGrpSpPr>
-        <p:cNvPr id="1" name=""/>
-        <p:cNvGrpSpPr/>
-        <p:nvPr/>
-      </p:nvGrpSpPr>
-      <p:grpSpPr>
-        <a:xfrm>
-          <a:off x="0" y="0"/>
-          <a:ext cx="0" cy="0"/>
-          <a:chOff x="0" y="0"/>
-          <a:chExt cx="0" cy="0"/>
-        </a:xfrm>
-      </p:grpSpPr>
-      <p:sp>
-        <p:nvSpPr>
-          <p:cNvPr id="332" name="Shape 332"/>
-          <p:cNvSpPr>
-            <a:spLocks noGrp="1"/>
-          </p:cNvSpPr>
-          <p:nvPr>
-            <p:ph type="title"/>
-          </p:nvPr>
-        </p:nvSpPr>
-        <p:spPr>
-          <a:xfrm>
-            <a:off x="685800" y="2111123"/>
-            <a:ext cx="7772400" cy="1546400"/>
-          </a:xfrm>
-          <a:prstGeom prst="rect">
-            <a:avLst/>
-          </a:prstGeom>
-        </p:spPr>
-        <p:txBody>
-          <a:bodyPr>
-            <a:normAutofit/>
-          </a:bodyPr>
-          <a:lstStyle/>
-          <a:p>
-            <a:pPr lvl="0">
-              <a:defRPr sz="1800" b="0">
-                <a:solidFill>
-                  <a:srgbClr val="000000"/>
-                </a:solidFill>
-                <a:uFillTx/>
-              </a:defRPr>
-            </a:pPr>
-            <a:r>
-              <a:rPr sz="4800" b="1">
-                <a:solidFill>
-                  <a:srgbClr val="3F3F3F"/>
-                </a:solidFill>
-                <a:uFill>
-                  <a:solidFill>
-                    <a:srgbClr val="3F3F3F"/>
-                  </a:solidFill>
-                </a:uFill>
-              </a:rPr>
-              <a:t>Eventual Persistence</a:t>
-            </a:r>
-          </a:p>
-        </p:txBody>
-      </p:sp>
-      <p:sp>
-        <p:nvSpPr>
-          <p:cNvPr id="333" name="Shape 333"/>
-          <p:cNvSpPr>
-            <a:spLocks noGrp="1"/>
-          </p:cNvSpPr>
-          <p:nvPr>
-            <p:ph type="body" idx="1"/>
-          </p:nvPr>
-        </p:nvSpPr>
-        <p:spPr>
-          <a:xfrm>
-            <a:off x="685800" y="3786737"/>
-            <a:ext cx="7772400" cy="1046400"/>
-          </a:xfrm>
-          <a:prstGeom prst="rect">
-            <a:avLst/>
-          </a:prstGeom>
-        </p:spPr>
-        <p:txBody>
-          <a:bodyPr/>
-          <a:lstStyle/>
-          <a:p>
-            <a:pPr lvl="0"/>
-            <a:endParaRPr/>
-          </a:p>
-        </p:txBody>
-      </p:sp>
-    </p:spTree>
-  </p:cSld>
-  <p:clrMapOvr>
-    <a:masterClrMapping/>
-  </p:clrMapOvr>
-  <p:transition xmlns:p14="http://schemas.microsoft.com/office/powerpoint/2010/main" spd="med"/>
+  <p:timing>
+    <p:tnLst>
+      <p:par>
+        <p:cTn xmlns:p14="http://schemas.microsoft.com/office/powerpoint/2010/main" id="1" dur="indefinite" restart="never" nodeType="tmRoot"/>
+      </p:par>
+    </p:tnLst>
+  </p:timing>
 </p:sld>
 </file>
 
@@ -25762,6 +25960,116 @@
       </p:grpSpPr>
       <p:sp>
         <p:nvSpPr>
+          <p:cNvPr id="332" name="Shape 332"/>
+          <p:cNvSpPr>
+            <a:spLocks noGrp="1"/>
+          </p:cNvSpPr>
+          <p:nvPr>
+            <p:ph type="title"/>
+          </p:nvPr>
+        </p:nvSpPr>
+        <p:spPr>
+          <a:xfrm>
+            <a:off x="685800" y="2111123"/>
+            <a:ext cx="7772400" cy="1546400"/>
+          </a:xfrm>
+          <a:prstGeom prst="rect">
+            <a:avLst/>
+          </a:prstGeom>
+        </p:spPr>
+        <p:txBody>
+          <a:bodyPr>
+            <a:normAutofit/>
+          </a:bodyPr>
+          <a:lstStyle/>
+          <a:p>
+            <a:pPr lvl="0">
+              <a:defRPr sz="1800" b="0">
+                <a:solidFill>
+                  <a:srgbClr val="000000"/>
+                </a:solidFill>
+                <a:uFillTx/>
+              </a:defRPr>
+            </a:pPr>
+            <a:r>
+              <a:rPr sz="4800" b="1">
+                <a:solidFill>
+                  <a:srgbClr val="3F3F3F"/>
+                </a:solidFill>
+                <a:uFill>
+                  <a:solidFill>
+                    <a:srgbClr val="3F3F3F"/>
+                  </a:solidFill>
+                </a:uFill>
+              </a:rPr>
+              <a:t>Eventual Persistence</a:t>
+            </a:r>
+          </a:p>
+        </p:txBody>
+      </p:sp>
+      <p:sp>
+        <p:nvSpPr>
+          <p:cNvPr id="333" name="Shape 333"/>
+          <p:cNvSpPr>
+            <a:spLocks noGrp="1"/>
+          </p:cNvSpPr>
+          <p:nvPr>
+            <p:ph type="body" idx="1"/>
+          </p:nvPr>
+        </p:nvSpPr>
+        <p:spPr>
+          <a:xfrm>
+            <a:off x="685800" y="3786737"/>
+            <a:ext cx="7772400" cy="1046400"/>
+          </a:xfrm>
+          <a:prstGeom prst="rect">
+            <a:avLst/>
+          </a:prstGeom>
+        </p:spPr>
+        <p:txBody>
+          <a:bodyPr/>
+          <a:lstStyle/>
+          <a:p>
+            <a:pPr lvl="0"/>
+            <a:endParaRPr/>
+          </a:p>
+        </p:txBody>
+      </p:sp>
+    </p:spTree>
+  </p:cSld>
+  <p:clrMapOvr>
+    <a:masterClrMapping/>
+  </p:clrMapOvr>
+  <p:transition xmlns:p14="http://schemas.microsoft.com/office/powerpoint/2010/main" spd="med"/>
+  <p:timing>
+    <p:tnLst>
+      <p:par>
+        <p:cTn xmlns:p14="http://schemas.microsoft.com/office/powerpoint/2010/main" id="1" dur="indefinite" restart="never" nodeType="tmRoot"/>
+      </p:par>
+    </p:tnLst>
+  </p:timing>
+</p:sld>
+</file>
+
+<file path=ppt/slides/slide51.xml><?xml version="1.0" encoding="utf-8"?>
+<p:sld xmlns:a="http://schemas.openxmlformats.org/drawingml/2006/main" xmlns:r="http://schemas.openxmlformats.org/officeDocument/2006/relationships" xmlns:p="http://schemas.openxmlformats.org/presentationml/2006/main">
+  <p:cSld>
+    <p:spTree>
+      <p:nvGrpSpPr>
+        <p:cNvPr id="1" name=""/>
+        <p:cNvGrpSpPr/>
+        <p:nvPr/>
+      </p:nvGrpSpPr>
+      <p:grpSpPr>
+        <a:xfrm>
+          <a:off x="0" y="0"/>
+          <a:ext cx="0" cy="0"/>
+          <a:chOff x="0" y="0"/>
+          <a:chExt cx="0" cy="0"/>
+        </a:xfrm>
+      </p:grpSpPr>
+      <p:sp>
+        <p:nvSpPr>
           <p:cNvPr id="353" name="Shape 353"/>
           <p:cNvSpPr>
             <a:spLocks noGrp="1"/>
@@ -25921,10 +26229,17 @@
     <a:masterClrMapping/>
   </p:clrMapOvr>
   <p:transition xmlns:p14="http://schemas.microsoft.com/office/powerpoint/2010/main" spd="med"/>
+  <p:timing>
+    <p:tnLst>
+      <p:par>
+        <p:cTn xmlns:p14="http://schemas.microsoft.com/office/powerpoint/2010/main" id="1" dur="indefinite" restart="never" nodeType="tmRoot"/>
+      </p:par>
+    </p:tnLst>
+  </p:timing>
 </p:sld>
 </file>
 
-<file path=ppt/slides/slide51.xml><?xml version="1.0" encoding="utf-8"?>
+<file path=ppt/slides/slide52.xml><?xml version="1.0" encoding="utf-8"?>
 <p:sld xmlns:a="http://schemas.openxmlformats.org/drawingml/2006/main" xmlns:r="http://schemas.openxmlformats.org/officeDocument/2006/relationships" xmlns:p="http://schemas.openxmlformats.org/presentationml/2006/main">
   <p:cSld>
     <p:spTree>
@@ -26329,7 +26644,7 @@
 </p:sld>
 </file>
 
-<file path=ppt/slides/slide52.xml><?xml version="1.0" encoding="utf-8"?>
+<file path=ppt/slides/slide53.xml><?xml version="1.0" encoding="utf-8"?>
 <p:sld xmlns:a="http://schemas.openxmlformats.org/drawingml/2006/main" xmlns:r="http://schemas.openxmlformats.org/officeDocument/2006/relationships" xmlns:p="http://schemas.openxmlformats.org/presentationml/2006/main">
   <p:cSld>
     <p:spTree>
@@ -26438,10 +26753,17 @@
     <a:masterClrMapping/>
   </p:clrMapOvr>
   <p:transition xmlns:p14="http://schemas.microsoft.com/office/powerpoint/2010/main" spd="med"/>
+  <p:timing>
+    <p:tnLst>
+      <p:par>
+        <p:cTn xmlns:p14="http://schemas.microsoft.com/office/powerpoint/2010/main" id="1" dur="indefinite" restart="never" nodeType="tmRoot"/>
+      </p:par>
+    </p:tnLst>
+  </p:timing>
 </p:sld>
 </file>
 
-<file path=ppt/slides/slide53.xml><?xml version="1.0" encoding="utf-8"?>
+<file path=ppt/slides/slide54.xml><?xml version="1.0" encoding="utf-8"?>
 <p:sld xmlns:a="http://schemas.openxmlformats.org/drawingml/2006/main" xmlns:r="http://schemas.openxmlformats.org/officeDocument/2006/relationships" xmlns:p="http://schemas.openxmlformats.org/presentationml/2006/main">
   <p:cSld>
     <p:spTree>
@@ -26531,10 +26853,17 @@
     <a:masterClrMapping/>
   </p:clrMapOvr>
   <p:transition xmlns:p14="http://schemas.microsoft.com/office/powerpoint/2010/main" spd="med"/>
+  <p:timing>
+    <p:tnLst>
+      <p:par>
+        <p:cTn xmlns:p14="http://schemas.microsoft.com/office/powerpoint/2010/main" id="1" dur="indefinite" restart="never" nodeType="tmRoot"/>
+      </p:par>
+    </p:tnLst>
+  </p:timing>
 </p:sld>
 </file>
 
-<file path=ppt/slides/slide54.xml><?xml version="1.0" encoding="utf-8"?>
+<file path=ppt/slides/slide55.xml><?xml version="1.0" encoding="utf-8"?>
 <p:sld xmlns:a="http://schemas.openxmlformats.org/drawingml/2006/main" xmlns:r="http://schemas.openxmlformats.org/officeDocument/2006/relationships" xmlns:p="http://schemas.openxmlformats.org/presentationml/2006/main">
   <p:cSld>
     <p:spTree>
@@ -26644,10 +26973,17 @@
     <a:masterClrMapping/>
   </p:clrMapOvr>
   <p:transition xmlns:p14="http://schemas.microsoft.com/office/powerpoint/2010/main" spd="med"/>
+  <p:timing>
+    <p:tnLst>
+      <p:par>
+        <p:cTn xmlns:p14="http://schemas.microsoft.com/office/powerpoint/2010/main" id="1" dur="indefinite" restart="never" nodeType="tmRoot"/>
+      </p:par>
+    </p:tnLst>
+  </p:timing>
 </p:sld>
 </file>
 
-<file path=ppt/slides/slide55.xml><?xml version="1.0" encoding="utf-8"?>
+<file path=ppt/slides/slide56.xml><?xml version="1.0" encoding="utf-8"?>
 <p:sld xmlns:a="http://schemas.openxmlformats.org/drawingml/2006/main" xmlns:r="http://schemas.openxmlformats.org/officeDocument/2006/relationships" xmlns:p="http://schemas.openxmlformats.org/presentationml/2006/main">
   <p:cSld>
     <p:spTree>
@@ -26929,10 +27265,17 @@
     <a:masterClrMapping/>
   </p:clrMapOvr>
   <p:transition xmlns:p14="http://schemas.microsoft.com/office/powerpoint/2010/main" spd="med"/>
+  <p:timing>
+    <p:tnLst>
+      <p:par>
+        <p:cTn xmlns:p14="http://schemas.microsoft.com/office/powerpoint/2010/main" id="1" dur="indefinite" restart="never" nodeType="tmRoot"/>
+      </p:par>
+    </p:tnLst>
+  </p:timing>
 </p:sld>
 </file>
 
-<file path=ppt/slides/slide56.xml><?xml version="1.0" encoding="utf-8"?>
+<file path=ppt/slides/slide57.xml><?xml version="1.0" encoding="utf-8"?>
 <p:sld xmlns:a="http://schemas.openxmlformats.org/drawingml/2006/main" xmlns:r="http://schemas.openxmlformats.org/officeDocument/2006/relationships" xmlns:p="http://schemas.openxmlformats.org/presentationml/2006/main">
   <p:cSld>
     <p:spTree>
@@ -27264,10 +27607,17 @@
     <a:masterClrMapping/>
   </p:clrMapOvr>
   <p:transition xmlns:p14="http://schemas.microsoft.com/office/powerpoint/2010/main" spd="med"/>
+  <p:timing>
+    <p:tnLst>
+      <p:par>
+        <p:cTn xmlns:p14="http://schemas.microsoft.com/office/powerpoint/2010/main" id="1" dur="indefinite" restart="never" nodeType="tmRoot"/>
+      </p:par>
+    </p:tnLst>
+  </p:timing>
 </p:sld>
 </file>
 
-<file path=ppt/slides/slide57.xml><?xml version="1.0" encoding="utf-8"?>
+<file path=ppt/slides/slide58.xml><?xml version="1.0" encoding="utf-8"?>
 <p:sld xmlns:a="http://schemas.openxmlformats.org/drawingml/2006/main" xmlns:r="http://schemas.openxmlformats.org/officeDocument/2006/relationships" xmlns:p="http://schemas.openxmlformats.org/presentationml/2006/main">
   <p:cSld>
     <p:spTree>
@@ -27534,6 +27884,13 @@
     <a:masterClrMapping/>
   </p:clrMapOvr>
   <p:transition xmlns:p14="http://schemas.microsoft.com/office/powerpoint/2010/main" spd="med"/>
+  <p:timing>
+    <p:tnLst>
+      <p:par>
+        <p:cTn xmlns:p14="http://schemas.microsoft.com/office/powerpoint/2010/main" id="1" dur="indefinite" restart="never" nodeType="tmRoot"/>
+      </p:par>
+    </p:tnLst>
+  </p:timing>
 </p:sld>
 </file>
 
@@ -27725,6 +28082,13 @@
     <a:masterClrMapping/>
   </p:clrMapOvr>
   <p:transition xmlns:p14="http://schemas.microsoft.com/office/powerpoint/2010/main" spd="med"/>
+  <p:timing>
+    <p:tnLst>
+      <p:par>
+        <p:cTn xmlns:p14="http://schemas.microsoft.com/office/powerpoint/2010/main" id="1" dur="indefinite" restart="never" nodeType="tmRoot"/>
+      </p:par>
+    </p:tnLst>
+  </p:timing>
 </p:sld>
 </file>
 

</xml_diff>